<commit_message>
Small changes and improvements
</commit_message>
<xml_diff>
--- a/ROS Hinweise und Screenshots.pptx
+++ b/ROS Hinweise und Screenshots.pptx
@@ -2,24 +2,25 @@
 <file path=ppt/presentation.xml><?xml version="1.0" encoding="utf-8"?>
 <p:presentation xmlns:a="http://schemas.openxmlformats.org/drawingml/2006/main" xmlns:r="http://schemas.openxmlformats.org/officeDocument/2006/relationships" xmlns:p="http://schemas.openxmlformats.org/presentationml/2006/main" saveSubsetFonts="1">
   <p:sldMasterIdLst>
-    <p:sldMasterId id="2147483660" r:id="rId1"/>
+    <p:sldMasterId id="2147483660" r:id="rId4"/>
   </p:sldMasterIdLst>
   <p:sldIdLst>
-    <p:sldId id="256" r:id="rId2"/>
-    <p:sldId id="257" r:id="rId3"/>
-    <p:sldId id="260" r:id="rId4"/>
-    <p:sldId id="261" r:id="rId5"/>
-    <p:sldId id="259" r:id="rId6"/>
-    <p:sldId id="258" r:id="rId7"/>
-    <p:sldId id="262" r:id="rId8"/>
-    <p:sldId id="272" r:id="rId9"/>
-    <p:sldId id="263" r:id="rId10"/>
-    <p:sldId id="264" r:id="rId11"/>
-    <p:sldId id="265" r:id="rId12"/>
-    <p:sldId id="267" r:id="rId13"/>
-    <p:sldId id="268" r:id="rId14"/>
-    <p:sldId id="270" r:id="rId15"/>
-    <p:sldId id="271" r:id="rId16"/>
+    <p:sldId id="256" r:id="rId5"/>
+    <p:sldId id="257" r:id="rId6"/>
+    <p:sldId id="260" r:id="rId7"/>
+    <p:sldId id="261" r:id="rId8"/>
+    <p:sldId id="259" r:id="rId9"/>
+    <p:sldId id="258" r:id="rId10"/>
+    <p:sldId id="262" r:id="rId11"/>
+    <p:sldId id="272" r:id="rId12"/>
+    <p:sldId id="263" r:id="rId13"/>
+    <p:sldId id="264" r:id="rId14"/>
+    <p:sldId id="265" r:id="rId15"/>
+    <p:sldId id="267" r:id="rId16"/>
+    <p:sldId id="268" r:id="rId17"/>
+    <p:sldId id="270" r:id="rId18"/>
+    <p:sldId id="273" r:id="rId19"/>
+    <p:sldId id="271" r:id="rId20"/>
   </p:sldIdLst>
   <p:sldSz cx="12192000" cy="6858000"/>
   <p:notesSz cx="6858000" cy="9144000"/>
@@ -129,7 +130,7 @@
 <file path=ppt/revisionInfo.xml><?xml version="1.0" encoding="utf-8"?>
 <p1510:revInfo xmlns:a="http://schemas.openxmlformats.org/drawingml/2006/main" xmlns:r="http://schemas.openxmlformats.org/officeDocument/2006/relationships" xmlns:p1510="http://schemas.microsoft.com/office/powerpoint/2015/10/main">
   <p1510:revLst>
-    <p1510:client id="{D3FC0335-5B25-455D-BEDA-E81357F6A0D1}" v="27" dt="2023-01-30T15:48:12.341"/>
+    <p1510:client id="{6FABDF7B-03D7-4BB3-8BDF-EC0F04497DF5}" v="3" dt="2023-02-02T09:39:49.691"/>
   </p1510:revLst>
 </p1510:revInfo>
 </file>
@@ -137,1029 +138,88 @@
 <file path=ppt/changesInfos/changesInfo1.xml><?xml version="1.0" encoding="utf-8"?>
 <pc:chgInfo xmlns:a="http://schemas.openxmlformats.org/drawingml/2006/main" xmlns:r="http://schemas.openxmlformats.org/officeDocument/2006/relationships" xmlns:ac="http://schemas.microsoft.com/office/drawing/2013/main/command" xmlns:pc="http://schemas.microsoft.com/office/powerpoint/2013/main/command">
   <pc:docChgLst>
-    <pc:chgData name="Marc Hoischen" userId="3964d706-f28e-46f1-9012-ca23af3f907f" providerId="ADAL" clId="{5A737B64-721F-4C53-9975-7A3F74653DC5}"/>
-    <pc:docChg chg="custSel addSld modSld">
-      <pc:chgData name="Marc Hoischen" userId="3964d706-f28e-46f1-9012-ca23af3f907f" providerId="ADAL" clId="{5A737B64-721F-4C53-9975-7A3F74653DC5}" dt="2023-01-05T20:19:15.061" v="53" actId="1076"/>
+    <pc:chgData name="Marc Hoischen" userId="3964d706-f28e-46f1-9012-ca23af3f907f" providerId="ADAL" clId="{6FABDF7B-03D7-4BB3-8BDF-EC0F04497DF5}"/>
+    <pc:docChg chg="custSel addSld delSld modSld sldOrd">
+      <pc:chgData name="Marc Hoischen" userId="3964d706-f28e-46f1-9012-ca23af3f907f" providerId="ADAL" clId="{6FABDF7B-03D7-4BB3-8BDF-EC0F04497DF5}" dt="2023-02-02T09:40:57.004" v="230" actId="20577"/>
       <pc:docMkLst>
         <pc:docMk/>
       </pc:docMkLst>
-      <pc:sldChg chg="addSp delSp modSp delDesignElem">
-        <pc:chgData name="Marc Hoischen" userId="3964d706-f28e-46f1-9012-ca23af3f907f" providerId="ADAL" clId="{5A737B64-721F-4C53-9975-7A3F74653DC5}" dt="2023-01-05T19:41:58.492" v="20" actId="1076"/>
-        <pc:sldMkLst>
-          <pc:docMk/>
-          <pc:sldMk cId="3416960537" sldId="257"/>
-        </pc:sldMkLst>
-        <pc:spChg chg="add del mod">
-          <ac:chgData name="Marc Hoischen" userId="3964d706-f28e-46f1-9012-ca23af3f907f" providerId="ADAL" clId="{5A737B64-721F-4C53-9975-7A3F74653DC5}" dt="2023-01-05T19:41:48.738" v="17" actId="478"/>
-          <ac:spMkLst>
-            <pc:docMk/>
-            <pc:sldMk cId="3416960537" sldId="257"/>
-            <ac:spMk id="2" creationId="{B37DC452-6306-40EC-8DFA-2C42C382009E}"/>
-          </ac:spMkLst>
-        </pc:spChg>
-        <pc:spChg chg="del">
-          <ac:chgData name="Marc Hoischen" userId="3964d706-f28e-46f1-9012-ca23af3f907f" providerId="ADAL" clId="{5A737B64-721F-4C53-9975-7A3F74653DC5}" dt="2023-01-05T19:41:44.988" v="16"/>
-          <ac:spMkLst>
-            <pc:docMk/>
-            <pc:sldMk cId="3416960537" sldId="257"/>
-            <ac:spMk id="16" creationId="{9EB54D17-3792-403D-9127-495845021D2B}"/>
-          </ac:spMkLst>
-        </pc:spChg>
-        <pc:spChg chg="del">
-          <ac:chgData name="Marc Hoischen" userId="3964d706-f28e-46f1-9012-ca23af3f907f" providerId="ADAL" clId="{5A737B64-721F-4C53-9975-7A3F74653DC5}" dt="2023-01-05T19:41:44.988" v="16"/>
-          <ac:spMkLst>
-            <pc:docMk/>
-            <pc:sldMk cId="3416960537" sldId="257"/>
-            <ac:spMk id="17" creationId="{05FB7726-C6A8-44D0-B179-A65DE454D836}"/>
-          </ac:spMkLst>
-        </pc:spChg>
-        <pc:picChg chg="mod modCrop">
-          <ac:chgData name="Marc Hoischen" userId="3964d706-f28e-46f1-9012-ca23af3f907f" providerId="ADAL" clId="{5A737B64-721F-4C53-9975-7A3F74653DC5}" dt="2023-01-05T19:41:58.492" v="20" actId="1076"/>
-          <ac:picMkLst>
-            <pc:docMk/>
-            <pc:sldMk cId="3416960537" sldId="257"/>
-            <ac:picMk id="5" creationId="{A0BD1EE1-C160-F097-FAF1-D9AF965F67D1}"/>
-          </ac:picMkLst>
-        </pc:picChg>
-      </pc:sldChg>
-      <pc:sldChg chg="addSp modSp">
-        <pc:chgData name="Marc Hoischen" userId="3964d706-f28e-46f1-9012-ca23af3f907f" providerId="ADAL" clId="{5A737B64-721F-4C53-9975-7A3F74653DC5}" dt="2023-01-05T20:19:15.061" v="53" actId="1076"/>
-        <pc:sldMkLst>
-          <pc:docMk/>
-          <pc:sldMk cId="1540035198" sldId="258"/>
-        </pc:sldMkLst>
-        <pc:picChg chg="add mod">
-          <ac:chgData name="Marc Hoischen" userId="3964d706-f28e-46f1-9012-ca23af3f907f" providerId="ADAL" clId="{5A737B64-721F-4C53-9975-7A3F74653DC5}" dt="2023-01-05T20:19:15.061" v="53" actId="1076"/>
-          <ac:picMkLst>
-            <pc:docMk/>
-            <pc:sldMk cId="1540035198" sldId="258"/>
-            <ac:picMk id="3" creationId="{ADED0E4A-F985-44DF-9F3C-17D8BFB4BC55}"/>
-          </ac:picMkLst>
-        </pc:picChg>
-      </pc:sldChg>
-      <pc:sldChg chg="addSp delSp modSp delDesignElem">
-        <pc:chgData name="Marc Hoischen" userId="3964d706-f28e-46f1-9012-ca23af3f907f" providerId="ADAL" clId="{5A737B64-721F-4C53-9975-7A3F74653DC5}" dt="2023-01-05T19:42:40.726" v="31" actId="1035"/>
-        <pc:sldMkLst>
-          <pc:docMk/>
-          <pc:sldMk cId="2333627442" sldId="259"/>
-        </pc:sldMkLst>
-        <pc:spChg chg="add del mod">
-          <ac:chgData name="Marc Hoischen" userId="3964d706-f28e-46f1-9012-ca23af3f907f" providerId="ADAL" clId="{5A737B64-721F-4C53-9975-7A3F74653DC5}" dt="2023-01-05T19:42:24.992" v="27" actId="478"/>
-          <ac:spMkLst>
-            <pc:docMk/>
-            <pc:sldMk cId="2333627442" sldId="259"/>
-            <ac:spMk id="2" creationId="{2B122A32-82B8-4BE7-BB43-54AB151EA87D}"/>
-          </ac:spMkLst>
-        </pc:spChg>
-        <pc:spChg chg="del">
-          <ac:chgData name="Marc Hoischen" userId="3964d706-f28e-46f1-9012-ca23af3f907f" providerId="ADAL" clId="{5A737B64-721F-4C53-9975-7A3F74653DC5}" dt="2023-01-05T19:42:22.491" v="26"/>
-          <ac:spMkLst>
-            <pc:docMk/>
-            <pc:sldMk cId="2333627442" sldId="259"/>
-            <ac:spMk id="44" creationId="{9EB54D17-3792-403D-9127-495845021D2B}"/>
-          </ac:spMkLst>
-        </pc:spChg>
-        <pc:spChg chg="del">
-          <ac:chgData name="Marc Hoischen" userId="3964d706-f28e-46f1-9012-ca23af3f907f" providerId="ADAL" clId="{5A737B64-721F-4C53-9975-7A3F74653DC5}" dt="2023-01-05T19:42:22.491" v="26"/>
-          <ac:spMkLst>
-            <pc:docMk/>
-            <pc:sldMk cId="2333627442" sldId="259"/>
-            <ac:spMk id="45" creationId="{05FB7726-C6A8-44D0-B179-A65DE454D836}"/>
-          </ac:spMkLst>
-        </pc:spChg>
-        <pc:picChg chg="mod modCrop">
-          <ac:chgData name="Marc Hoischen" userId="3964d706-f28e-46f1-9012-ca23af3f907f" providerId="ADAL" clId="{5A737B64-721F-4C53-9975-7A3F74653DC5}" dt="2023-01-05T19:42:40.726" v="31" actId="1035"/>
-          <ac:picMkLst>
-            <pc:docMk/>
-            <pc:sldMk cId="2333627442" sldId="259"/>
-            <ac:picMk id="7" creationId="{3D9BC7AC-4784-F0CC-2FDC-02AE883C97E5}"/>
-          </ac:picMkLst>
-        </pc:picChg>
-      </pc:sldChg>
-      <pc:sldChg chg="addSp delSp modSp add">
-        <pc:chgData name="Marc Hoischen" userId="3964d706-f28e-46f1-9012-ca23af3f907f" providerId="ADAL" clId="{5A737B64-721F-4C53-9975-7A3F74653DC5}" dt="2023-01-05T19:56:24.183" v="37" actId="14100"/>
-        <pc:sldMkLst>
-          <pc:docMk/>
-          <pc:sldMk cId="1447984990" sldId="260"/>
-        </pc:sldMkLst>
-        <pc:spChg chg="del">
-          <ac:chgData name="Marc Hoischen" userId="3964d706-f28e-46f1-9012-ca23af3f907f" providerId="ADAL" clId="{5A737B64-721F-4C53-9975-7A3F74653DC5}" dt="2023-01-05T19:56:15.280" v="34" actId="478"/>
-          <ac:spMkLst>
-            <pc:docMk/>
-            <pc:sldMk cId="1447984990" sldId="260"/>
-            <ac:spMk id="2" creationId="{8EDC9838-125D-4260-8F48-69254430612F}"/>
-          </ac:spMkLst>
-        </pc:spChg>
-        <pc:spChg chg="del">
-          <ac:chgData name="Marc Hoischen" userId="3964d706-f28e-46f1-9012-ca23af3f907f" providerId="ADAL" clId="{5A737B64-721F-4C53-9975-7A3F74653DC5}" dt="2023-01-05T19:56:12.656" v="33"/>
-          <ac:spMkLst>
-            <pc:docMk/>
-            <pc:sldMk cId="1447984990" sldId="260"/>
-            <ac:spMk id="3" creationId="{23E801EE-AC52-47FA-B4F6-F6951F3E1598}"/>
-          </ac:spMkLst>
-        </pc:spChg>
-        <pc:picChg chg="add mod">
-          <ac:chgData name="Marc Hoischen" userId="3964d706-f28e-46f1-9012-ca23af3f907f" providerId="ADAL" clId="{5A737B64-721F-4C53-9975-7A3F74653DC5}" dt="2023-01-05T19:56:24.183" v="37" actId="14100"/>
-          <ac:picMkLst>
-            <pc:docMk/>
-            <pc:sldMk cId="1447984990" sldId="260"/>
-            <ac:picMk id="4" creationId="{0B90686E-A9CB-44ED-B6D2-288BB5967E52}"/>
-          </ac:picMkLst>
-        </pc:picChg>
-      </pc:sldChg>
-      <pc:sldChg chg="addSp delSp modSp add">
-        <pc:chgData name="Marc Hoischen" userId="3964d706-f28e-46f1-9012-ca23af3f907f" providerId="ADAL" clId="{5A737B64-721F-4C53-9975-7A3F74653DC5}" dt="2023-01-05T20:05:52.130" v="48" actId="1076"/>
-        <pc:sldMkLst>
-          <pc:docMk/>
-          <pc:sldMk cId="2503231887" sldId="261"/>
-        </pc:sldMkLst>
-        <pc:picChg chg="add del mod">
-          <ac:chgData name="Marc Hoischen" userId="3964d706-f28e-46f1-9012-ca23af3f907f" providerId="ADAL" clId="{5A737B64-721F-4C53-9975-7A3F74653DC5}" dt="2023-01-05T20:05:19.763" v="42" actId="478"/>
-          <ac:picMkLst>
-            <pc:docMk/>
-            <pc:sldMk cId="2503231887" sldId="261"/>
-            <ac:picMk id="4" creationId="{F9A3EBF2-5A04-45DF-8EC3-FC4B5393D602}"/>
-          </ac:picMkLst>
-        </pc:picChg>
-        <pc:picChg chg="add mod">
-          <ac:chgData name="Marc Hoischen" userId="3964d706-f28e-46f1-9012-ca23af3f907f" providerId="ADAL" clId="{5A737B64-721F-4C53-9975-7A3F74653DC5}" dt="2023-01-05T20:05:52.130" v="48" actId="1076"/>
-          <ac:picMkLst>
-            <pc:docMk/>
-            <pc:sldMk cId="2503231887" sldId="261"/>
-            <ac:picMk id="5" creationId="{528E7881-F44C-46A4-8498-876FEAA5ABEF}"/>
-          </ac:picMkLst>
-        </pc:picChg>
-      </pc:sldChg>
-    </pc:docChg>
-  </pc:docChgLst>
-  <pc:docChgLst>
-    <pc:chgData name="Marc Hoischen" userId="3964d706-f28e-46f1-9012-ca23af3f907f" providerId="ADAL" clId="{D3FC0335-5B25-455D-BEDA-E81357F6A0D1}"/>
-    <pc:docChg chg="undo redo custSel addSld delSld modSld sldOrd">
-      <pc:chgData name="Marc Hoischen" userId="3964d706-f28e-46f1-9012-ca23af3f907f" providerId="ADAL" clId="{D3FC0335-5B25-455D-BEDA-E81357F6A0D1}" dt="2023-01-30T15:52:02.072" v="4159" actId="14100"/>
-      <pc:docMkLst>
-        <pc:docMk/>
-      </pc:docMkLst>
-      <pc:sldChg chg="modSp mod">
-        <pc:chgData name="Marc Hoischen" userId="3964d706-f28e-46f1-9012-ca23af3f907f" providerId="ADAL" clId="{D3FC0335-5B25-455D-BEDA-E81357F6A0D1}" dt="2023-01-30T15:52:02.072" v="4159" actId="14100"/>
-        <pc:sldMkLst>
-          <pc:docMk/>
-          <pc:sldMk cId="3841114767" sldId="256"/>
-        </pc:sldMkLst>
-        <pc:spChg chg="mod">
-          <ac:chgData name="Marc Hoischen" userId="3964d706-f28e-46f1-9012-ca23af3f907f" providerId="ADAL" clId="{D3FC0335-5B25-455D-BEDA-E81357F6A0D1}" dt="2023-01-30T15:48:52.132" v="4037" actId="20577"/>
-          <ac:spMkLst>
-            <pc:docMk/>
-            <pc:sldMk cId="3841114767" sldId="256"/>
-            <ac:spMk id="2" creationId="{6A6A19DB-66D8-05B7-F1B4-EF25FA6DB7BC}"/>
-          </ac:spMkLst>
-        </pc:spChg>
-        <pc:spChg chg="mod">
-          <ac:chgData name="Marc Hoischen" userId="3964d706-f28e-46f1-9012-ca23af3f907f" providerId="ADAL" clId="{D3FC0335-5B25-455D-BEDA-E81357F6A0D1}" dt="2023-01-30T15:52:02.072" v="4159" actId="14100"/>
-          <ac:spMkLst>
-            <pc:docMk/>
-            <pc:sldMk cId="3841114767" sldId="256"/>
-            <ac:spMk id="3" creationId="{2A10F51E-F0AA-8CAE-2B26-C9745E82AE05}"/>
-          </ac:spMkLst>
-        </pc:spChg>
-      </pc:sldChg>
-      <pc:sldChg chg="addSp delSp modSp mod setBg">
-        <pc:chgData name="Marc Hoischen" userId="3964d706-f28e-46f1-9012-ca23af3f907f" providerId="ADAL" clId="{D3FC0335-5B25-455D-BEDA-E81357F6A0D1}" dt="2023-01-30T13:01:59.752" v="1316" actId="1076"/>
-        <pc:sldMkLst>
-          <pc:docMk/>
-          <pc:sldMk cId="3416960537" sldId="257"/>
-        </pc:sldMkLst>
-        <pc:spChg chg="add del">
-          <ac:chgData name="Marc Hoischen" userId="3964d706-f28e-46f1-9012-ca23af3f907f" providerId="ADAL" clId="{D3FC0335-5B25-455D-BEDA-E81357F6A0D1}" dt="2023-01-05T13:29:14.984" v="14" actId="26606"/>
-          <ac:spMkLst>
-            <pc:docMk/>
-            <pc:sldMk cId="3416960537" sldId="257"/>
-            <ac:spMk id="2" creationId="{5F9C5266-9C6E-4B7A-0BCE-A038E8874504}"/>
-          </ac:spMkLst>
-        </pc:spChg>
-        <pc:spChg chg="add mod">
-          <ac:chgData name="Marc Hoischen" userId="3964d706-f28e-46f1-9012-ca23af3f907f" providerId="ADAL" clId="{D3FC0335-5B25-455D-BEDA-E81357F6A0D1}" dt="2023-01-30T13:01:59.752" v="1316" actId="1076"/>
-          <ac:spMkLst>
-            <pc:docMk/>
-            <pc:sldMk cId="3416960537" sldId="257"/>
-            <ac:spMk id="2" creationId="{E52FB976-FBFE-8A3C-6F66-029EA23448E5}"/>
-          </ac:spMkLst>
-        </pc:spChg>
-        <pc:spChg chg="add del">
-          <ac:chgData name="Marc Hoischen" userId="3964d706-f28e-46f1-9012-ca23af3f907f" providerId="ADAL" clId="{D3FC0335-5B25-455D-BEDA-E81357F6A0D1}" dt="2023-01-05T13:29:14.984" v="13" actId="26606"/>
-          <ac:spMkLst>
-            <pc:docMk/>
-            <pc:sldMk cId="3416960537" sldId="257"/>
-            <ac:spMk id="10" creationId="{9EB54D17-3792-403D-9127-495845021D2B}"/>
-          </ac:spMkLst>
-        </pc:spChg>
-        <pc:spChg chg="add del">
-          <ac:chgData name="Marc Hoischen" userId="3964d706-f28e-46f1-9012-ca23af3f907f" providerId="ADAL" clId="{D3FC0335-5B25-455D-BEDA-E81357F6A0D1}" dt="2023-01-05T13:29:14.984" v="13" actId="26606"/>
-          <ac:spMkLst>
-            <pc:docMk/>
-            <pc:sldMk cId="3416960537" sldId="257"/>
-            <ac:spMk id="12" creationId="{05FB7726-C6A8-44D0-B179-A65DE454D836}"/>
-          </ac:spMkLst>
-        </pc:spChg>
-        <pc:spChg chg="add del">
-          <ac:chgData name="Marc Hoischen" userId="3964d706-f28e-46f1-9012-ca23af3f907f" providerId="ADAL" clId="{D3FC0335-5B25-455D-BEDA-E81357F6A0D1}" dt="2023-01-05T13:29:14.984" v="13" actId="26606"/>
-          <ac:spMkLst>
-            <pc:docMk/>
-            <pc:sldMk cId="3416960537" sldId="257"/>
-            <ac:spMk id="14" creationId="{6CA79669-85CF-4A8E-9B66-F63A5C5B570B}"/>
-          </ac:spMkLst>
-        </pc:spChg>
-        <pc:spChg chg="add">
-          <ac:chgData name="Marc Hoischen" userId="3964d706-f28e-46f1-9012-ca23af3f907f" providerId="ADAL" clId="{D3FC0335-5B25-455D-BEDA-E81357F6A0D1}" dt="2023-01-05T13:29:14.984" v="14" actId="26606"/>
-          <ac:spMkLst>
-            <pc:docMk/>
-            <pc:sldMk cId="3416960537" sldId="257"/>
-            <ac:spMk id="16" creationId="{9EB54D17-3792-403D-9127-495845021D2B}"/>
-          </ac:spMkLst>
-        </pc:spChg>
-        <pc:spChg chg="add">
-          <ac:chgData name="Marc Hoischen" userId="3964d706-f28e-46f1-9012-ca23af3f907f" providerId="ADAL" clId="{D3FC0335-5B25-455D-BEDA-E81357F6A0D1}" dt="2023-01-05T13:29:14.984" v="14" actId="26606"/>
-          <ac:spMkLst>
-            <pc:docMk/>
-            <pc:sldMk cId="3416960537" sldId="257"/>
-            <ac:spMk id="17" creationId="{05FB7726-C6A8-44D0-B179-A65DE454D836}"/>
-          </ac:spMkLst>
-        </pc:spChg>
-        <pc:picChg chg="mod">
-          <ac:chgData name="Marc Hoischen" userId="3964d706-f28e-46f1-9012-ca23af3f907f" providerId="ADAL" clId="{D3FC0335-5B25-455D-BEDA-E81357F6A0D1}" dt="2023-01-05T13:29:14.984" v="14" actId="26606"/>
-          <ac:picMkLst>
-            <pc:docMk/>
-            <pc:sldMk cId="3416960537" sldId="257"/>
-            <ac:picMk id="5" creationId="{A0BD1EE1-C160-F097-FAF1-D9AF965F67D1}"/>
-          </ac:picMkLst>
-        </pc:picChg>
-      </pc:sldChg>
-      <pc:sldChg chg="addSp delSp modSp add mod ord">
-        <pc:chgData name="Marc Hoischen" userId="3964d706-f28e-46f1-9012-ca23af3f907f" providerId="ADAL" clId="{D3FC0335-5B25-455D-BEDA-E81357F6A0D1}" dt="2023-01-30T14:30:42.558" v="1846" actId="313"/>
-        <pc:sldMkLst>
-          <pc:docMk/>
-          <pc:sldMk cId="1540035198" sldId="258"/>
-        </pc:sldMkLst>
-        <pc:spChg chg="add mod">
-          <ac:chgData name="Marc Hoischen" userId="3964d706-f28e-46f1-9012-ca23af3f907f" providerId="ADAL" clId="{D3FC0335-5B25-455D-BEDA-E81357F6A0D1}" dt="2023-01-05T13:26:57.509" v="1" actId="478"/>
-          <ac:spMkLst>
-            <pc:docMk/>
-            <pc:sldMk cId="1540035198" sldId="258"/>
-            <ac:spMk id="4" creationId="{82B2EA55-1DA5-9E19-5FE8-B0B2FFA7B78D}"/>
-          </ac:spMkLst>
-        </pc:spChg>
-        <pc:spChg chg="add del">
-          <ac:chgData name="Marc Hoischen" userId="3964d706-f28e-46f1-9012-ca23af3f907f" providerId="ADAL" clId="{D3FC0335-5B25-455D-BEDA-E81357F6A0D1}" dt="2023-01-30T14:12:32.275" v="1689" actId="478"/>
-          <ac:spMkLst>
-            <pc:docMk/>
-            <pc:sldMk cId="1540035198" sldId="258"/>
-            <ac:spMk id="6" creationId="{E3679709-4F3C-CDEA-FC16-4949784F3E56}"/>
-          </ac:spMkLst>
-        </pc:spChg>
-        <pc:spChg chg="add mod">
-          <ac:chgData name="Marc Hoischen" userId="3964d706-f28e-46f1-9012-ca23af3f907f" providerId="ADAL" clId="{D3FC0335-5B25-455D-BEDA-E81357F6A0D1}" dt="2023-01-30T14:30:42.558" v="1846" actId="313"/>
-          <ac:spMkLst>
-            <pc:docMk/>
-            <pc:sldMk cId="1540035198" sldId="258"/>
-            <ac:spMk id="7" creationId="{FE6EAE17-02CB-A8DD-1FEF-8D9D2B0C4372}"/>
-          </ac:spMkLst>
-        </pc:spChg>
-        <pc:picChg chg="del">
-          <ac:chgData name="Marc Hoischen" userId="3964d706-f28e-46f1-9012-ca23af3f907f" providerId="ADAL" clId="{D3FC0335-5B25-455D-BEDA-E81357F6A0D1}" dt="2023-01-05T13:26:57.509" v="1" actId="478"/>
-          <ac:picMkLst>
-            <pc:docMk/>
-            <pc:sldMk cId="1540035198" sldId="258"/>
-            <ac:picMk id="5" creationId="{A0BD1EE1-C160-F097-FAF1-D9AF965F67D1}"/>
-          </ac:picMkLst>
-        </pc:picChg>
-      </pc:sldChg>
-      <pc:sldChg chg="addSp delSp modSp add mod setBg">
-        <pc:chgData name="Marc Hoischen" userId="3964d706-f28e-46f1-9012-ca23af3f907f" providerId="ADAL" clId="{D3FC0335-5B25-455D-BEDA-E81357F6A0D1}" dt="2023-01-30T15:41:04.819" v="3521" actId="313"/>
-        <pc:sldMkLst>
-          <pc:docMk/>
-          <pc:sldMk cId="2333627442" sldId="259"/>
-        </pc:sldMkLst>
-        <pc:spChg chg="add del mod ord">
-          <ac:chgData name="Marc Hoischen" userId="3964d706-f28e-46f1-9012-ca23af3f907f" providerId="ADAL" clId="{D3FC0335-5B25-455D-BEDA-E81357F6A0D1}" dt="2023-01-05T13:29:34.042" v="19" actId="26606"/>
-          <ac:spMkLst>
-            <pc:docMk/>
-            <pc:sldMk cId="2333627442" sldId="259"/>
-            <ac:spMk id="2" creationId="{5F9C5266-9C6E-4B7A-0BCE-A038E8874504}"/>
-          </ac:spMkLst>
-        </pc:spChg>
-        <pc:spChg chg="add mod">
-          <ac:chgData name="Marc Hoischen" userId="3964d706-f28e-46f1-9012-ca23af3f907f" providerId="ADAL" clId="{D3FC0335-5B25-455D-BEDA-E81357F6A0D1}" dt="2023-01-30T15:41:04.819" v="3521" actId="313"/>
-          <ac:spMkLst>
-            <pc:docMk/>
-            <pc:sldMk cId="2333627442" sldId="259"/>
-            <ac:spMk id="2" creationId="{FFF3B949-317D-8772-2D03-D89A07D06792}"/>
-          </ac:spMkLst>
-        </pc:spChg>
-        <pc:spChg chg="add del mod">
-          <ac:chgData name="Marc Hoischen" userId="3964d706-f28e-46f1-9012-ca23af3f907f" providerId="ADAL" clId="{D3FC0335-5B25-455D-BEDA-E81357F6A0D1}" dt="2023-01-05T13:29:05.253" v="11" actId="26606"/>
-          <ac:spMkLst>
-            <pc:docMk/>
-            <pc:sldMk cId="2333627442" sldId="259"/>
-            <ac:spMk id="4" creationId="{CA77FBC7-0089-E418-6880-C81B41BB004C}"/>
-          </ac:spMkLst>
-        </pc:spChg>
-        <pc:spChg chg="add del">
-          <ac:chgData name="Marc Hoischen" userId="3964d706-f28e-46f1-9012-ca23af3f907f" providerId="ADAL" clId="{D3FC0335-5B25-455D-BEDA-E81357F6A0D1}" dt="2023-01-05T13:29:34.042" v="19" actId="26606"/>
-          <ac:spMkLst>
-            <pc:docMk/>
-            <pc:sldMk cId="2333627442" sldId="259"/>
-            <ac:spMk id="12" creationId="{9D3B3C7E-BC2D-4436-8B03-AC421FA66787}"/>
-          </ac:spMkLst>
-        </pc:spChg>
-        <pc:spChg chg="add del">
-          <ac:chgData name="Marc Hoischen" userId="3964d706-f28e-46f1-9012-ca23af3f907f" providerId="ADAL" clId="{D3FC0335-5B25-455D-BEDA-E81357F6A0D1}" dt="2023-01-05T13:29:34.042" v="19" actId="26606"/>
-          <ac:spMkLst>
-            <pc:docMk/>
-            <pc:sldMk cId="2333627442" sldId="259"/>
-            <ac:spMk id="19" creationId="{DD8EACB7-D372-470B-B76E-A829D00310CD}"/>
-          </ac:spMkLst>
-        </pc:spChg>
-        <pc:spChg chg="add del">
-          <ac:chgData name="Marc Hoischen" userId="3964d706-f28e-46f1-9012-ca23af3f907f" providerId="ADAL" clId="{D3FC0335-5B25-455D-BEDA-E81357F6A0D1}" dt="2023-01-05T13:29:34.042" v="19" actId="26606"/>
-          <ac:spMkLst>
-            <pc:docMk/>
-            <pc:sldMk cId="2333627442" sldId="259"/>
-            <ac:spMk id="21" creationId="{FBE11A49-02A1-4D4C-9A49-CDF496B1094F}"/>
-          </ac:spMkLst>
-        </pc:spChg>
-        <pc:spChg chg="add del">
-          <ac:chgData name="Marc Hoischen" userId="3964d706-f28e-46f1-9012-ca23af3f907f" providerId="ADAL" clId="{D3FC0335-5B25-455D-BEDA-E81357F6A0D1}" dt="2023-01-05T13:29:34.026" v="18" actId="26606"/>
-          <ac:spMkLst>
-            <pc:docMk/>
-            <pc:sldMk cId="2333627442" sldId="259"/>
-            <ac:spMk id="30" creationId="{0D9C7F70-5C5B-E03A-E4E2-21494F3FC2B5}"/>
-          </ac:spMkLst>
-        </pc:spChg>
-        <pc:spChg chg="add del">
-          <ac:chgData name="Marc Hoischen" userId="3964d706-f28e-46f1-9012-ca23af3f907f" providerId="ADAL" clId="{D3FC0335-5B25-455D-BEDA-E81357F6A0D1}" dt="2023-01-05T13:29:26.226" v="16" actId="26606"/>
-          <ac:spMkLst>
-            <pc:docMk/>
-            <pc:sldMk cId="2333627442" sldId="259"/>
-            <ac:spMk id="31" creationId="{9EB54D17-3792-403D-9127-495845021D2B}"/>
-          </ac:spMkLst>
-        </pc:spChg>
-        <pc:spChg chg="add del">
-          <ac:chgData name="Marc Hoischen" userId="3964d706-f28e-46f1-9012-ca23af3f907f" providerId="ADAL" clId="{D3FC0335-5B25-455D-BEDA-E81357F6A0D1}" dt="2023-01-05T13:29:26.226" v="16" actId="26606"/>
-          <ac:spMkLst>
-            <pc:docMk/>
-            <pc:sldMk cId="2333627442" sldId="259"/>
-            <ac:spMk id="33" creationId="{05FB7726-C6A8-44D0-B179-A65DE454D836}"/>
-          </ac:spMkLst>
-        </pc:spChg>
-        <pc:spChg chg="add del">
-          <ac:chgData name="Marc Hoischen" userId="3964d706-f28e-46f1-9012-ca23af3f907f" providerId="ADAL" clId="{D3FC0335-5B25-455D-BEDA-E81357F6A0D1}" dt="2023-01-05T13:29:34.026" v="18" actId="26606"/>
-          <ac:spMkLst>
-            <pc:docMk/>
-            <pc:sldMk cId="2333627442" sldId="259"/>
-            <ac:spMk id="35" creationId="{939C6AAB-48AC-41A3-95C2-6BF83715DF62}"/>
-          </ac:spMkLst>
-        </pc:spChg>
-        <pc:spChg chg="add del">
-          <ac:chgData name="Marc Hoischen" userId="3964d706-f28e-46f1-9012-ca23af3f907f" providerId="ADAL" clId="{D3FC0335-5B25-455D-BEDA-E81357F6A0D1}" dt="2023-01-05T13:29:34.026" v="18" actId="26606"/>
-          <ac:spMkLst>
-            <pc:docMk/>
-            <pc:sldMk cId="2333627442" sldId="259"/>
-            <ac:spMk id="36" creationId="{158E38A4-F699-490C-8D1F-E8AD332D9B45}"/>
-          </ac:spMkLst>
-        </pc:spChg>
-        <pc:spChg chg="add del">
-          <ac:chgData name="Marc Hoischen" userId="3964d706-f28e-46f1-9012-ca23af3f907f" providerId="ADAL" clId="{D3FC0335-5B25-455D-BEDA-E81357F6A0D1}" dt="2023-01-05T13:29:34.026" v="18" actId="26606"/>
-          <ac:spMkLst>
-            <pc:docMk/>
-            <pc:sldMk cId="2333627442" sldId="259"/>
-            <ac:spMk id="37" creationId="{F6EE861B-7D2F-4B7C-A6E3-5937E81B8025}"/>
-          </ac:spMkLst>
-        </pc:spChg>
-        <pc:spChg chg="add del">
-          <ac:chgData name="Marc Hoischen" userId="3964d706-f28e-46f1-9012-ca23af3f907f" providerId="ADAL" clId="{D3FC0335-5B25-455D-BEDA-E81357F6A0D1}" dt="2023-01-05T13:29:34.026" v="18" actId="26606"/>
-          <ac:spMkLst>
-            <pc:docMk/>
-            <pc:sldMk cId="2333627442" sldId="259"/>
-            <ac:spMk id="38" creationId="{5F9C5266-9C6E-4B7A-0BCE-A038E8874504}"/>
-          </ac:spMkLst>
-        </pc:spChg>
-        <pc:spChg chg="add">
-          <ac:chgData name="Marc Hoischen" userId="3964d706-f28e-46f1-9012-ca23af3f907f" providerId="ADAL" clId="{D3FC0335-5B25-455D-BEDA-E81357F6A0D1}" dt="2023-01-05T13:29:34.042" v="19" actId="26606"/>
-          <ac:spMkLst>
-            <pc:docMk/>
-            <pc:sldMk cId="2333627442" sldId="259"/>
-            <ac:spMk id="44" creationId="{9EB54D17-3792-403D-9127-495845021D2B}"/>
-          </ac:spMkLst>
-        </pc:spChg>
-        <pc:spChg chg="add">
-          <ac:chgData name="Marc Hoischen" userId="3964d706-f28e-46f1-9012-ca23af3f907f" providerId="ADAL" clId="{D3FC0335-5B25-455D-BEDA-E81357F6A0D1}" dt="2023-01-05T13:29:34.042" v="19" actId="26606"/>
-          <ac:spMkLst>
-            <pc:docMk/>
-            <pc:sldMk cId="2333627442" sldId="259"/>
-            <ac:spMk id="45" creationId="{05FB7726-C6A8-44D0-B179-A65DE454D836}"/>
-          </ac:spMkLst>
-        </pc:spChg>
-        <pc:grpChg chg="add del">
-          <ac:chgData name="Marc Hoischen" userId="3964d706-f28e-46f1-9012-ca23af3f907f" providerId="ADAL" clId="{D3FC0335-5B25-455D-BEDA-E81357F6A0D1}" dt="2023-01-05T13:29:34.042" v="19" actId="26606"/>
-          <ac:grpSpMkLst>
-            <pc:docMk/>
-            <pc:sldMk cId="2333627442" sldId="259"/>
-            <ac:grpSpMk id="14" creationId="{79B5D0C1-066E-4C02-A6B8-59FAE4A19724}"/>
-          </ac:grpSpMkLst>
-        </pc:grpChg>
-        <pc:grpChg chg="add del">
-          <ac:chgData name="Marc Hoischen" userId="3964d706-f28e-46f1-9012-ca23af3f907f" providerId="ADAL" clId="{D3FC0335-5B25-455D-BEDA-E81357F6A0D1}" dt="2023-01-05T13:29:34.042" v="19" actId="26606"/>
-          <ac:grpSpMkLst>
-            <pc:docMk/>
-            <pc:sldMk cId="2333627442" sldId="259"/>
-            <ac:grpSpMk id="23" creationId="{F1732D3A-CFF0-45BE-AD79-F83D0272C6C6}"/>
-          </ac:grpSpMkLst>
-        </pc:grpChg>
-        <pc:grpChg chg="add del">
-          <ac:chgData name="Marc Hoischen" userId="3964d706-f28e-46f1-9012-ca23af3f907f" providerId="ADAL" clId="{D3FC0335-5B25-455D-BEDA-E81357F6A0D1}" dt="2023-01-05T13:29:34.026" v="18" actId="26606"/>
-          <ac:grpSpMkLst>
-            <pc:docMk/>
-            <pc:sldMk cId="2333627442" sldId="259"/>
-            <ac:grpSpMk id="39" creationId="{53745597-CF0F-4C14-83C4-612B382A9091}"/>
-          </ac:grpSpMkLst>
-        </pc:grpChg>
-        <pc:picChg chg="del">
-          <ac:chgData name="Marc Hoischen" userId="3964d706-f28e-46f1-9012-ca23af3f907f" providerId="ADAL" clId="{D3FC0335-5B25-455D-BEDA-E81357F6A0D1}" dt="2023-01-05T13:27:04.410" v="3" actId="478"/>
-          <ac:picMkLst>
-            <pc:docMk/>
-            <pc:sldMk cId="2333627442" sldId="259"/>
-            <ac:picMk id="5" creationId="{A0BD1EE1-C160-F097-FAF1-D9AF965F67D1}"/>
-          </ac:picMkLst>
-        </pc:picChg>
-        <pc:picChg chg="add mod">
-          <ac:chgData name="Marc Hoischen" userId="3964d706-f28e-46f1-9012-ca23af3f907f" providerId="ADAL" clId="{D3FC0335-5B25-455D-BEDA-E81357F6A0D1}" dt="2023-01-05T13:29:34.026" v="18" actId="26606"/>
-          <ac:picMkLst>
-            <pc:docMk/>
-            <pc:sldMk cId="2333627442" sldId="259"/>
-            <ac:picMk id="7" creationId="{3D9BC7AC-4784-F0CC-2FDC-02AE883C97E5}"/>
-          </ac:picMkLst>
-        </pc:picChg>
-      </pc:sldChg>
-      <pc:sldChg chg="addSp modSp mod">
-        <pc:chgData name="Marc Hoischen" userId="3964d706-f28e-46f1-9012-ca23af3f907f" providerId="ADAL" clId="{D3FC0335-5B25-455D-BEDA-E81357F6A0D1}" dt="2023-01-30T13:01:39.939" v="1314" actId="1076"/>
-        <pc:sldMkLst>
-          <pc:docMk/>
-          <pc:sldMk cId="1447984990" sldId="260"/>
-        </pc:sldMkLst>
-        <pc:spChg chg="add mod">
-          <ac:chgData name="Marc Hoischen" userId="3964d706-f28e-46f1-9012-ca23af3f907f" providerId="ADAL" clId="{D3FC0335-5B25-455D-BEDA-E81357F6A0D1}" dt="2023-01-30T13:01:39.939" v="1314" actId="1076"/>
-          <ac:spMkLst>
-            <pc:docMk/>
-            <pc:sldMk cId="1447984990" sldId="260"/>
-            <ac:spMk id="2" creationId="{704D6CEB-8ADE-8E48-9664-18C5231E1DA2}"/>
-          </ac:spMkLst>
-        </pc:spChg>
-      </pc:sldChg>
-      <pc:sldChg chg="add del">
-        <pc:chgData name="Marc Hoischen" userId="3964d706-f28e-46f1-9012-ca23af3f907f" providerId="ADAL" clId="{D3FC0335-5B25-455D-BEDA-E81357F6A0D1}" dt="2023-01-05T13:27:10.501" v="5"/>
-        <pc:sldMkLst>
-          <pc:docMk/>
-          <pc:sldMk cId="4039055111" sldId="260"/>
-        </pc:sldMkLst>
-      </pc:sldChg>
-      <pc:sldChg chg="addSp modSp mod">
-        <pc:chgData name="Marc Hoischen" userId="3964d706-f28e-46f1-9012-ca23af3f907f" providerId="ADAL" clId="{D3FC0335-5B25-455D-BEDA-E81357F6A0D1}" dt="2023-01-30T14:11:53.841" v="1686" actId="1076"/>
-        <pc:sldMkLst>
-          <pc:docMk/>
-          <pc:sldMk cId="2503231887" sldId="261"/>
-        </pc:sldMkLst>
-        <pc:spChg chg="add mod">
-          <ac:chgData name="Marc Hoischen" userId="3964d706-f28e-46f1-9012-ca23af3f907f" providerId="ADAL" clId="{D3FC0335-5B25-455D-BEDA-E81357F6A0D1}" dt="2023-01-30T14:11:53.841" v="1686" actId="1076"/>
-          <ac:spMkLst>
-            <pc:docMk/>
-            <pc:sldMk cId="2503231887" sldId="261"/>
-            <ac:spMk id="4" creationId="{1426617F-14C2-33AA-78CB-8BB2E25220DF}"/>
-          </ac:spMkLst>
-        </pc:spChg>
-      </pc:sldChg>
-      <pc:sldChg chg="addSp delSp modSp new mod">
-        <pc:chgData name="Marc Hoischen" userId="3964d706-f28e-46f1-9012-ca23af3f907f" providerId="ADAL" clId="{D3FC0335-5B25-455D-BEDA-E81357F6A0D1}" dt="2023-01-30T14:32:36.949" v="1971" actId="20577"/>
-        <pc:sldMkLst>
-          <pc:docMk/>
-          <pc:sldMk cId="2577687613" sldId="262"/>
-        </pc:sldMkLst>
-        <pc:spChg chg="del">
-          <ac:chgData name="Marc Hoischen" userId="3964d706-f28e-46f1-9012-ca23af3f907f" providerId="ADAL" clId="{D3FC0335-5B25-455D-BEDA-E81357F6A0D1}" dt="2023-01-06T13:25:50.672" v="22" actId="478"/>
-          <ac:spMkLst>
-            <pc:docMk/>
-            <pc:sldMk cId="2577687613" sldId="262"/>
-            <ac:spMk id="2" creationId="{492BE599-AA07-FF44-8BC9-19AAD2C8573D}"/>
-          </ac:spMkLst>
-        </pc:spChg>
-        <pc:spChg chg="add mod">
-          <ac:chgData name="Marc Hoischen" userId="3964d706-f28e-46f1-9012-ca23af3f907f" providerId="ADAL" clId="{D3FC0335-5B25-455D-BEDA-E81357F6A0D1}" dt="2023-01-30T14:32:36.949" v="1971" actId="20577"/>
-          <ac:spMkLst>
-            <pc:docMk/>
-            <pc:sldMk cId="2577687613" sldId="262"/>
-            <ac:spMk id="2" creationId="{9857AF61-7CC7-58E1-2599-30A9B40B8A8E}"/>
-          </ac:spMkLst>
-        </pc:spChg>
-        <pc:spChg chg="del">
-          <ac:chgData name="Marc Hoischen" userId="3964d706-f28e-46f1-9012-ca23af3f907f" providerId="ADAL" clId="{D3FC0335-5B25-455D-BEDA-E81357F6A0D1}" dt="2023-01-06T13:25:44.120" v="21" actId="22"/>
-          <ac:spMkLst>
-            <pc:docMk/>
-            <pc:sldMk cId="2577687613" sldId="262"/>
-            <ac:spMk id="3" creationId="{63A0BB00-89CB-FA32-258B-B2BB9412D451}"/>
-          </ac:spMkLst>
-        </pc:spChg>
-        <pc:spChg chg="add del mod">
-          <ac:chgData name="Marc Hoischen" userId="3964d706-f28e-46f1-9012-ca23af3f907f" providerId="ADAL" clId="{D3FC0335-5B25-455D-BEDA-E81357F6A0D1}" dt="2023-01-06T13:29:34.333" v="29" actId="478"/>
-          <ac:spMkLst>
-            <pc:docMk/>
-            <pc:sldMk cId="2577687613" sldId="262"/>
-            <ac:spMk id="9" creationId="{22D77F39-6F8E-E570-661C-14472DC04D8F}"/>
-          </ac:spMkLst>
-        </pc:spChg>
-        <pc:picChg chg="add del mod ord">
-          <ac:chgData name="Marc Hoischen" userId="3964d706-f28e-46f1-9012-ca23af3f907f" providerId="ADAL" clId="{D3FC0335-5B25-455D-BEDA-E81357F6A0D1}" dt="2023-01-06T13:29:29.977" v="28" actId="478"/>
-          <ac:picMkLst>
-            <pc:docMk/>
-            <pc:sldMk cId="2577687613" sldId="262"/>
-            <ac:picMk id="5" creationId="{D1A5DC47-4617-9364-2CB8-29F65ED16899}"/>
-          </ac:picMkLst>
-        </pc:picChg>
-        <pc:picChg chg="add mod">
-          <ac:chgData name="Marc Hoischen" userId="3964d706-f28e-46f1-9012-ca23af3f907f" providerId="ADAL" clId="{D3FC0335-5B25-455D-BEDA-E81357F6A0D1}" dt="2023-01-06T13:31:12.857" v="32" actId="1076"/>
-          <ac:picMkLst>
-            <pc:docMk/>
-            <pc:sldMk cId="2577687613" sldId="262"/>
-            <ac:picMk id="7" creationId="{C55962F3-EBBA-8989-73C8-95226BDCFB88}"/>
-          </ac:picMkLst>
-        </pc:picChg>
-      </pc:sldChg>
-      <pc:sldChg chg="addSp delSp modSp new mod">
-        <pc:chgData name="Marc Hoischen" userId="3964d706-f28e-46f1-9012-ca23af3f907f" providerId="ADAL" clId="{D3FC0335-5B25-455D-BEDA-E81357F6A0D1}" dt="2023-01-30T15:01:23.429" v="2400" actId="14100"/>
-        <pc:sldMkLst>
-          <pc:docMk/>
-          <pc:sldMk cId="2012158817" sldId="263"/>
-        </pc:sldMkLst>
-        <pc:spChg chg="add mod">
-          <ac:chgData name="Marc Hoischen" userId="3964d706-f28e-46f1-9012-ca23af3f907f" providerId="ADAL" clId="{D3FC0335-5B25-455D-BEDA-E81357F6A0D1}" dt="2023-01-30T14:46:06.116" v="2064" actId="20577"/>
-          <ac:spMkLst>
-            <pc:docMk/>
-            <pc:sldMk cId="2012158817" sldId="263"/>
-            <ac:spMk id="2" creationId="{7459E7D4-9708-B228-8E19-731C20A311CC}"/>
-          </ac:spMkLst>
-        </pc:spChg>
-        <pc:spChg chg="del">
-          <ac:chgData name="Marc Hoischen" userId="3964d706-f28e-46f1-9012-ca23af3f907f" providerId="ADAL" clId="{D3FC0335-5B25-455D-BEDA-E81357F6A0D1}" dt="2023-01-12T09:52:54.885" v="34" actId="478"/>
-          <ac:spMkLst>
-            <pc:docMk/>
-            <pc:sldMk cId="2012158817" sldId="263"/>
-            <ac:spMk id="2" creationId="{B8391CB0-4FF8-7DC5-BD71-6A85FFF7A5E6}"/>
-          </ac:spMkLst>
-        </pc:spChg>
-        <pc:spChg chg="del">
-          <ac:chgData name="Marc Hoischen" userId="3964d706-f28e-46f1-9012-ca23af3f907f" providerId="ADAL" clId="{D3FC0335-5B25-455D-BEDA-E81357F6A0D1}" dt="2023-01-12T09:53:18.865" v="35" actId="22"/>
-          <ac:spMkLst>
-            <pc:docMk/>
-            <pc:sldMk cId="2012158817" sldId="263"/>
-            <ac:spMk id="3" creationId="{B65C31D5-73C5-ECF8-FF14-F0035436125F}"/>
-          </ac:spMkLst>
-        </pc:spChg>
-        <pc:spChg chg="add mod">
-          <ac:chgData name="Marc Hoischen" userId="3964d706-f28e-46f1-9012-ca23af3f907f" providerId="ADAL" clId="{D3FC0335-5B25-455D-BEDA-E81357F6A0D1}" dt="2023-01-30T15:01:23.429" v="2400" actId="14100"/>
-          <ac:spMkLst>
-            <pc:docMk/>
-            <pc:sldMk cId="2012158817" sldId="263"/>
-            <ac:spMk id="3" creationId="{C2DA747D-DE71-5317-A61F-2A033E9E794E}"/>
-          </ac:spMkLst>
-        </pc:spChg>
-        <pc:spChg chg="add del mod">
-          <ac:chgData name="Marc Hoischen" userId="3964d706-f28e-46f1-9012-ca23af3f907f" providerId="ADAL" clId="{D3FC0335-5B25-455D-BEDA-E81357F6A0D1}" dt="2023-01-30T14:38:57.741" v="2043" actId="478"/>
-          <ac:spMkLst>
-            <pc:docMk/>
-            <pc:sldMk cId="2012158817" sldId="263"/>
-            <ac:spMk id="7" creationId="{F6D51B6D-14C4-13A7-5ECF-4BF14D8FF108}"/>
-          </ac:spMkLst>
-        </pc:spChg>
-        <pc:picChg chg="add mod ord">
-          <ac:chgData name="Marc Hoischen" userId="3964d706-f28e-46f1-9012-ca23af3f907f" providerId="ADAL" clId="{D3FC0335-5B25-455D-BEDA-E81357F6A0D1}" dt="2023-01-12T10:21:07.362" v="117" actId="1076"/>
-          <ac:picMkLst>
-            <pc:docMk/>
-            <pc:sldMk cId="2012158817" sldId="263"/>
-            <ac:picMk id="5" creationId="{E7E1E376-A3C3-211F-5AC9-F5DCA06A81E2}"/>
-          </ac:picMkLst>
-        </pc:picChg>
-      </pc:sldChg>
-      <pc:sldChg chg="addSp delSp modSp new mod">
-        <pc:chgData name="Marc Hoischen" userId="3964d706-f28e-46f1-9012-ca23af3f907f" providerId="ADAL" clId="{D3FC0335-5B25-455D-BEDA-E81357F6A0D1}" dt="2023-01-30T15:03:51.605" v="2404" actId="1076"/>
-        <pc:sldMkLst>
-          <pc:docMk/>
-          <pc:sldMk cId="3761056504" sldId="264"/>
-        </pc:sldMkLst>
-        <pc:spChg chg="add mod">
-          <ac:chgData name="Marc Hoischen" userId="3964d706-f28e-46f1-9012-ca23af3f907f" providerId="ADAL" clId="{D3FC0335-5B25-455D-BEDA-E81357F6A0D1}" dt="2023-01-30T15:03:51.605" v="2404" actId="1076"/>
-          <ac:spMkLst>
-            <pc:docMk/>
-            <pc:sldMk cId="3761056504" sldId="264"/>
-            <ac:spMk id="2" creationId="{81E0DA05-4822-C254-2DF3-91B12C743C88}"/>
-          </ac:spMkLst>
-        </pc:spChg>
-        <pc:spChg chg="del">
-          <ac:chgData name="Marc Hoischen" userId="3964d706-f28e-46f1-9012-ca23af3f907f" providerId="ADAL" clId="{D3FC0335-5B25-455D-BEDA-E81357F6A0D1}" dt="2023-01-12T09:53:53.087" v="40" actId="478"/>
-          <ac:spMkLst>
-            <pc:docMk/>
-            <pc:sldMk cId="3761056504" sldId="264"/>
-            <ac:spMk id="2" creationId="{A0080FA0-60C3-79BC-D03F-549AF3B39764}"/>
-          </ac:spMkLst>
-        </pc:spChg>
-        <pc:spChg chg="del">
-          <ac:chgData name="Marc Hoischen" userId="3964d706-f28e-46f1-9012-ca23af3f907f" providerId="ADAL" clId="{D3FC0335-5B25-455D-BEDA-E81357F6A0D1}" dt="2023-01-12T09:54:49.694" v="42" actId="478"/>
-          <ac:spMkLst>
-            <pc:docMk/>
-            <pc:sldMk cId="3761056504" sldId="264"/>
-            <ac:spMk id="3" creationId="{68F73867-CB7F-1390-D9A5-CFAF6D9ACEC6}"/>
-          </ac:spMkLst>
-        </pc:spChg>
-        <pc:picChg chg="add mod">
-          <ac:chgData name="Marc Hoischen" userId="3964d706-f28e-46f1-9012-ca23af3f907f" providerId="ADAL" clId="{D3FC0335-5B25-455D-BEDA-E81357F6A0D1}" dt="2023-01-12T09:55:47.618" v="51" actId="1076"/>
-          <ac:picMkLst>
-            <pc:docMk/>
-            <pc:sldMk cId="3761056504" sldId="264"/>
-            <ac:picMk id="5" creationId="{10094C81-4DDA-9D04-8A1E-6D3449F2BA8A}"/>
-          </ac:picMkLst>
-        </pc:picChg>
-        <pc:picChg chg="add mod">
-          <ac:chgData name="Marc Hoischen" userId="3964d706-f28e-46f1-9012-ca23af3f907f" providerId="ADAL" clId="{D3FC0335-5B25-455D-BEDA-E81357F6A0D1}" dt="2023-01-12T09:55:42.245" v="50" actId="1076"/>
-          <ac:picMkLst>
-            <pc:docMk/>
-            <pc:sldMk cId="3761056504" sldId="264"/>
-            <ac:picMk id="7" creationId="{BD9D8306-544A-821A-C63A-F43AE29A7282}"/>
-          </ac:picMkLst>
-        </pc:picChg>
-      </pc:sldChg>
-      <pc:sldChg chg="addSp delSp modSp new mod">
-        <pc:chgData name="Marc Hoischen" userId="3964d706-f28e-46f1-9012-ca23af3f907f" providerId="ADAL" clId="{D3FC0335-5B25-455D-BEDA-E81357F6A0D1}" dt="2023-01-30T15:21:23.466" v="3148" actId="20577"/>
-        <pc:sldMkLst>
-          <pc:docMk/>
-          <pc:sldMk cId="2540757653" sldId="265"/>
-        </pc:sldMkLst>
-        <pc:spChg chg="add mod">
-          <ac:chgData name="Marc Hoischen" userId="3964d706-f28e-46f1-9012-ca23af3f907f" providerId="ADAL" clId="{D3FC0335-5B25-455D-BEDA-E81357F6A0D1}" dt="2023-01-30T15:12:24.440" v="2772" actId="20577"/>
-          <ac:spMkLst>
-            <pc:docMk/>
-            <pc:sldMk cId="2540757653" sldId="265"/>
-            <ac:spMk id="2" creationId="{3FB2784A-09D1-231E-3B07-A023F35FBA95}"/>
-          </ac:spMkLst>
-        </pc:spChg>
-        <pc:spChg chg="del">
-          <ac:chgData name="Marc Hoischen" userId="3964d706-f28e-46f1-9012-ca23af3f907f" providerId="ADAL" clId="{D3FC0335-5B25-455D-BEDA-E81357F6A0D1}" dt="2023-01-12T10:14:22.393" v="54" actId="478"/>
-          <ac:spMkLst>
-            <pc:docMk/>
-            <pc:sldMk cId="2540757653" sldId="265"/>
-            <ac:spMk id="2" creationId="{B304506F-FDA3-BF1A-5C2E-E8174BDDBB59}"/>
-          </ac:spMkLst>
-        </pc:spChg>
-        <pc:spChg chg="del">
-          <ac:chgData name="Marc Hoischen" userId="3964d706-f28e-46f1-9012-ca23af3f907f" providerId="ADAL" clId="{D3FC0335-5B25-455D-BEDA-E81357F6A0D1}" dt="2023-01-12T10:14:27.320" v="55" actId="478"/>
-          <ac:spMkLst>
-            <pc:docMk/>
-            <pc:sldMk cId="2540757653" sldId="265"/>
-            <ac:spMk id="3" creationId="{1BFB48C0-6BBF-0F2D-F5E8-C4A7A152BA93}"/>
-          </ac:spMkLst>
-        </pc:spChg>
-        <pc:spChg chg="add mod">
-          <ac:chgData name="Marc Hoischen" userId="3964d706-f28e-46f1-9012-ca23af3f907f" providerId="ADAL" clId="{D3FC0335-5B25-455D-BEDA-E81357F6A0D1}" dt="2023-01-30T15:21:23.466" v="3148" actId="20577"/>
-          <ac:spMkLst>
-            <pc:docMk/>
-            <pc:sldMk cId="2540757653" sldId="265"/>
-            <ac:spMk id="3" creationId="{771D9BF4-6231-B2BF-E134-41A1B455F6EB}"/>
-          </ac:spMkLst>
-        </pc:spChg>
-        <pc:spChg chg="add del mod">
-          <ac:chgData name="Marc Hoischen" userId="3964d706-f28e-46f1-9012-ca23af3f907f" providerId="ADAL" clId="{D3FC0335-5B25-455D-BEDA-E81357F6A0D1}" dt="2023-01-30T15:11:44.788" v="2659" actId="478"/>
-          <ac:spMkLst>
-            <pc:docMk/>
-            <pc:sldMk cId="2540757653" sldId="265"/>
-            <ac:spMk id="6" creationId="{9C48B9E8-9288-A4C4-B9B7-3D55361F50C1}"/>
-          </ac:spMkLst>
-        </pc:spChg>
-        <pc:picChg chg="add mod">
-          <ac:chgData name="Marc Hoischen" userId="3964d706-f28e-46f1-9012-ca23af3f907f" providerId="ADAL" clId="{D3FC0335-5B25-455D-BEDA-E81357F6A0D1}" dt="2023-01-12T10:14:29.502" v="56" actId="1076"/>
-          <ac:picMkLst>
-            <pc:docMk/>
-            <pc:sldMk cId="2540757653" sldId="265"/>
-            <ac:picMk id="5" creationId="{F5479D3D-64B9-E84C-5CE5-734A064620C1}"/>
-          </ac:picMkLst>
-        </pc:picChg>
-      </pc:sldChg>
-      <pc:sldChg chg="addSp modSp new del mod">
-        <pc:chgData name="Marc Hoischen" userId="3964d706-f28e-46f1-9012-ca23af3f907f" providerId="ADAL" clId="{D3FC0335-5B25-455D-BEDA-E81357F6A0D1}" dt="2023-01-16T14:28:11.598" v="582" actId="47"/>
-        <pc:sldMkLst>
-          <pc:docMk/>
-          <pc:sldMk cId="2302395300" sldId="266"/>
-        </pc:sldMkLst>
-        <pc:spChg chg="mod">
-          <ac:chgData name="Marc Hoischen" userId="3964d706-f28e-46f1-9012-ca23af3f907f" providerId="ADAL" clId="{D3FC0335-5B25-455D-BEDA-E81357F6A0D1}" dt="2023-01-16T12:52:34.456" v="179" actId="20577"/>
-          <ac:spMkLst>
-            <pc:docMk/>
-            <pc:sldMk cId="2302395300" sldId="266"/>
-            <ac:spMk id="2" creationId="{46A99F04-8615-81D7-5C2B-E89C4934BC55}"/>
-          </ac:spMkLst>
-        </pc:spChg>
-        <pc:spChg chg="mod">
-          <ac:chgData name="Marc Hoischen" userId="3964d706-f28e-46f1-9012-ca23af3f907f" providerId="ADAL" clId="{D3FC0335-5B25-455D-BEDA-E81357F6A0D1}" dt="2023-01-16T13:00:33.945" v="449" actId="27636"/>
-          <ac:spMkLst>
-            <pc:docMk/>
-            <pc:sldMk cId="2302395300" sldId="266"/>
-            <ac:spMk id="3" creationId="{54DDDAD6-82F7-B9A6-9167-0CB4DA35FD5F}"/>
-          </ac:spMkLst>
-        </pc:spChg>
-        <pc:picChg chg="add mod">
-          <ac:chgData name="Marc Hoischen" userId="3964d706-f28e-46f1-9012-ca23af3f907f" providerId="ADAL" clId="{D3FC0335-5B25-455D-BEDA-E81357F6A0D1}" dt="2023-01-16T13:00:17.251" v="443" actId="1076"/>
-          <ac:picMkLst>
-            <pc:docMk/>
-            <pc:sldMk cId="2302395300" sldId="266"/>
-            <ac:picMk id="5" creationId="{32C7B6F4-811D-160C-914B-AB65E0DEB07F}"/>
-          </ac:picMkLst>
-        </pc:picChg>
-        <pc:picChg chg="add mod">
-          <ac:chgData name="Marc Hoischen" userId="3964d706-f28e-46f1-9012-ca23af3f907f" providerId="ADAL" clId="{D3FC0335-5B25-455D-BEDA-E81357F6A0D1}" dt="2023-01-16T13:01:59.854" v="464" actId="1076"/>
-          <ac:picMkLst>
-            <pc:docMk/>
-            <pc:sldMk cId="2302395300" sldId="266"/>
-            <ac:picMk id="7" creationId="{EC89D80A-23D5-4D88-A54D-E3A5B37F0420}"/>
-          </ac:picMkLst>
-        </pc:picChg>
-      </pc:sldChg>
-      <pc:sldChg chg="addSp modSp new mod">
-        <pc:chgData name="Marc Hoischen" userId="3964d706-f28e-46f1-9012-ca23af3f907f" providerId="ADAL" clId="{D3FC0335-5B25-455D-BEDA-E81357F6A0D1}" dt="2023-01-30T15:45:57.214" v="3703" actId="20577"/>
-        <pc:sldMkLst>
-          <pc:docMk/>
-          <pc:sldMk cId="2445375648" sldId="267"/>
-        </pc:sldMkLst>
-        <pc:spChg chg="mod">
-          <ac:chgData name="Marc Hoischen" userId="3964d706-f28e-46f1-9012-ca23af3f907f" providerId="ADAL" clId="{D3FC0335-5B25-455D-BEDA-E81357F6A0D1}" dt="2023-01-30T15:45:57.214" v="3703" actId="20577"/>
-          <ac:spMkLst>
-            <pc:docMk/>
-            <pc:sldMk cId="2445375648" sldId="267"/>
-            <ac:spMk id="2" creationId="{55A9BE63-4A27-8D85-E773-6A819403E2BC}"/>
-          </ac:spMkLst>
-        </pc:spChg>
-        <pc:spChg chg="mod">
-          <ac:chgData name="Marc Hoischen" userId="3964d706-f28e-46f1-9012-ca23af3f907f" providerId="ADAL" clId="{D3FC0335-5B25-455D-BEDA-E81357F6A0D1}" dt="2023-01-16T14:27:35.963" v="580" actId="403"/>
-          <ac:spMkLst>
-            <pc:docMk/>
-            <pc:sldMk cId="2445375648" sldId="267"/>
-            <ac:spMk id="3" creationId="{D89F6AB9-9DDC-D8B8-77E5-7825EE1C87B8}"/>
-          </ac:spMkLst>
-        </pc:spChg>
-        <pc:spChg chg="mod">
-          <ac:chgData name="Marc Hoischen" userId="3964d706-f28e-46f1-9012-ca23af3f907f" providerId="ADAL" clId="{D3FC0335-5B25-455D-BEDA-E81357F6A0D1}" dt="2023-01-16T14:27:27.033" v="579" actId="27636"/>
-          <ac:spMkLst>
-            <pc:docMk/>
-            <pc:sldMk cId="2445375648" sldId="267"/>
-            <ac:spMk id="4" creationId="{461164D0-96BD-334A-21D9-BC965BE84067}"/>
-          </ac:spMkLst>
-        </pc:spChg>
-        <pc:picChg chg="add mod">
-          <ac:chgData name="Marc Hoischen" userId="3964d706-f28e-46f1-9012-ca23af3f907f" providerId="ADAL" clId="{D3FC0335-5B25-455D-BEDA-E81357F6A0D1}" dt="2023-01-16T14:27:45.628" v="581" actId="1076"/>
-          <ac:picMkLst>
-            <pc:docMk/>
-            <pc:sldMk cId="2445375648" sldId="267"/>
-            <ac:picMk id="5" creationId="{4245C45F-B561-6B63-9D53-17C23435C2E7}"/>
-          </ac:picMkLst>
-        </pc:picChg>
-        <pc:picChg chg="add mod">
-          <ac:chgData name="Marc Hoischen" userId="3964d706-f28e-46f1-9012-ca23af3f907f" providerId="ADAL" clId="{D3FC0335-5B25-455D-BEDA-E81357F6A0D1}" dt="2023-01-16T13:02:25.179" v="467" actId="688"/>
-          <ac:picMkLst>
-            <pc:docMk/>
-            <pc:sldMk cId="2445375648" sldId="267"/>
-            <ac:picMk id="6" creationId="{1DE2305B-3117-9E20-0721-6D8F01FF823B}"/>
-          </ac:picMkLst>
-        </pc:picChg>
-      </pc:sldChg>
-      <pc:sldChg chg="addSp delSp modSp new mod">
-        <pc:chgData name="Marc Hoischen" userId="3964d706-f28e-46f1-9012-ca23af3f907f" providerId="ADAL" clId="{D3FC0335-5B25-455D-BEDA-E81357F6A0D1}" dt="2023-01-30T15:28:18.488" v="3471" actId="1076"/>
-        <pc:sldMkLst>
-          <pc:docMk/>
-          <pc:sldMk cId="685684884" sldId="268"/>
-        </pc:sldMkLst>
-        <pc:spChg chg="mod">
-          <ac:chgData name="Marc Hoischen" userId="3964d706-f28e-46f1-9012-ca23af3f907f" providerId="ADAL" clId="{D3FC0335-5B25-455D-BEDA-E81357F6A0D1}" dt="2023-01-30T15:27:42.826" v="3466" actId="14100"/>
-          <ac:spMkLst>
-            <pc:docMk/>
-            <pc:sldMk cId="685684884" sldId="268"/>
-            <ac:spMk id="2" creationId="{C1153154-B971-4EA8-2AAF-BB1FFA14114F}"/>
-          </ac:spMkLst>
-        </pc:spChg>
-        <pc:spChg chg="add mod">
-          <ac:chgData name="Marc Hoischen" userId="3964d706-f28e-46f1-9012-ca23af3f907f" providerId="ADAL" clId="{D3FC0335-5B25-455D-BEDA-E81357F6A0D1}" dt="2023-01-30T15:26:15.302" v="3458" actId="313"/>
-          <ac:spMkLst>
-            <pc:docMk/>
-            <pc:sldMk cId="685684884" sldId="268"/>
-            <ac:spMk id="3" creationId="{0BB9616C-622A-D1AC-3D2F-16C31E661509}"/>
-          </ac:spMkLst>
-        </pc:spChg>
-        <pc:spChg chg="del">
-          <ac:chgData name="Marc Hoischen" userId="3964d706-f28e-46f1-9012-ca23af3f907f" providerId="ADAL" clId="{D3FC0335-5B25-455D-BEDA-E81357F6A0D1}" dt="2023-01-16T14:26:47.241" v="517" actId="22"/>
-          <ac:spMkLst>
-            <pc:docMk/>
-            <pc:sldMk cId="685684884" sldId="268"/>
-            <ac:spMk id="3" creationId="{CA3615F8-AB3F-44AF-A672-24888E1C7AB6}"/>
-          </ac:spMkLst>
-        </pc:spChg>
-        <pc:spChg chg="add mod">
-          <ac:chgData name="Marc Hoischen" userId="3964d706-f28e-46f1-9012-ca23af3f907f" providerId="ADAL" clId="{D3FC0335-5B25-455D-BEDA-E81357F6A0D1}" dt="2023-01-30T15:25:39.739" v="3452" actId="14100"/>
-          <ac:spMkLst>
-            <pc:docMk/>
-            <pc:sldMk cId="685684884" sldId="268"/>
-            <ac:spMk id="4" creationId="{ED70E4CE-F81C-01F8-1A5E-F34899853D3C}"/>
-          </ac:spMkLst>
-        </pc:spChg>
-        <pc:picChg chg="add mod ord">
-          <ac:chgData name="Marc Hoischen" userId="3964d706-f28e-46f1-9012-ca23af3f907f" providerId="ADAL" clId="{D3FC0335-5B25-455D-BEDA-E81357F6A0D1}" dt="2023-01-30T15:28:18.488" v="3471" actId="1076"/>
-          <ac:picMkLst>
-            <pc:docMk/>
-            <pc:sldMk cId="685684884" sldId="268"/>
-            <ac:picMk id="5" creationId="{6D4B8290-9DF5-E13E-22E7-61C0CD307F90}"/>
-          </ac:picMkLst>
-        </pc:picChg>
-      </pc:sldChg>
-      <pc:sldChg chg="addSp delSp modSp new del mod">
-        <pc:chgData name="Marc Hoischen" userId="3964d706-f28e-46f1-9012-ca23af3f907f" providerId="ADAL" clId="{D3FC0335-5B25-455D-BEDA-E81357F6A0D1}" dt="2023-01-30T15:24:18.941" v="3364" actId="47"/>
-        <pc:sldMkLst>
-          <pc:docMk/>
-          <pc:sldMk cId="2566425655" sldId="269"/>
-        </pc:sldMkLst>
-        <pc:spChg chg="del">
-          <ac:chgData name="Marc Hoischen" userId="3964d706-f28e-46f1-9012-ca23af3f907f" providerId="ADAL" clId="{D3FC0335-5B25-455D-BEDA-E81357F6A0D1}" dt="2023-01-19T09:47:32.103" v="584" actId="22"/>
-          <ac:spMkLst>
-            <pc:docMk/>
-            <pc:sldMk cId="2566425655" sldId="269"/>
-            <ac:spMk id="3" creationId="{2E937638-217F-C813-15B3-24FAC4AA4E9B}"/>
-          </ac:spMkLst>
-        </pc:spChg>
-        <pc:spChg chg="add mod">
-          <ac:chgData name="Marc Hoischen" userId="3964d706-f28e-46f1-9012-ca23af3f907f" providerId="ADAL" clId="{D3FC0335-5B25-455D-BEDA-E81357F6A0D1}" dt="2023-01-30T15:24:17.916" v="3363" actId="478"/>
-          <ac:spMkLst>
-            <pc:docMk/>
-            <pc:sldMk cId="2566425655" sldId="269"/>
-            <ac:spMk id="4" creationId="{F3C84D79-822E-A193-27CE-7BD50EC0AC1A}"/>
-          </ac:spMkLst>
-        </pc:spChg>
-        <pc:picChg chg="add del mod ord">
-          <ac:chgData name="Marc Hoischen" userId="3964d706-f28e-46f1-9012-ca23af3f907f" providerId="ADAL" clId="{D3FC0335-5B25-455D-BEDA-E81357F6A0D1}" dt="2023-01-30T15:24:17.916" v="3363" actId="478"/>
-          <ac:picMkLst>
-            <pc:docMk/>
-            <pc:sldMk cId="2566425655" sldId="269"/>
-            <ac:picMk id="5" creationId="{EF8CB767-28F1-A78B-04C4-21A3D6C9FDA3}"/>
-          </ac:picMkLst>
-        </pc:picChg>
-      </pc:sldChg>
-      <pc:sldChg chg="addSp delSp modSp new mod">
-        <pc:chgData name="Marc Hoischen" userId="3964d706-f28e-46f1-9012-ca23af3f907f" providerId="ADAL" clId="{D3FC0335-5B25-455D-BEDA-E81357F6A0D1}" dt="2023-01-30T15:48:30.581" v="4026" actId="20577"/>
-        <pc:sldMkLst>
-          <pc:docMk/>
-          <pc:sldMk cId="3555087119" sldId="270"/>
-        </pc:sldMkLst>
-        <pc:spChg chg="add del">
-          <ac:chgData name="Marc Hoischen" userId="3964d706-f28e-46f1-9012-ca23af3f907f" providerId="ADAL" clId="{D3FC0335-5B25-455D-BEDA-E81357F6A0D1}" dt="2023-01-30T15:44:54.920" v="3662" actId="478"/>
-          <ac:spMkLst>
-            <pc:docMk/>
-            <pc:sldMk cId="3555087119" sldId="270"/>
-            <ac:spMk id="2" creationId="{784599ED-6B87-576E-4A49-507B5FB37962}"/>
-          </ac:spMkLst>
-        </pc:spChg>
-        <pc:spChg chg="add del">
-          <ac:chgData name="Marc Hoischen" userId="3964d706-f28e-46f1-9012-ca23af3f907f" providerId="ADAL" clId="{D3FC0335-5B25-455D-BEDA-E81357F6A0D1}" dt="2023-01-30T15:44:57.557" v="3664" actId="478"/>
-          <ac:spMkLst>
-            <pc:docMk/>
-            <pc:sldMk cId="3555087119" sldId="270"/>
-            <ac:spMk id="3" creationId="{00309DB3-40C2-EF48-43C6-B241A39CED97}"/>
-          </ac:spMkLst>
-        </pc:spChg>
-        <pc:spChg chg="add del mod">
-          <ac:chgData name="Marc Hoischen" userId="3964d706-f28e-46f1-9012-ca23af3f907f" providerId="ADAL" clId="{D3FC0335-5B25-455D-BEDA-E81357F6A0D1}" dt="2023-01-30T15:44:36.343" v="3653"/>
-          <ac:spMkLst>
-            <pc:docMk/>
-            <pc:sldMk cId="3555087119" sldId="270"/>
-            <ac:spMk id="4" creationId="{1F00673C-39A7-AB27-484C-29D7EE5C54EE}"/>
-          </ac:spMkLst>
-        </pc:spChg>
-        <pc:spChg chg="add del mod">
-          <ac:chgData name="Marc Hoischen" userId="3964d706-f28e-46f1-9012-ca23af3f907f" providerId="ADAL" clId="{D3FC0335-5B25-455D-BEDA-E81357F6A0D1}" dt="2023-01-30T15:44:29.149" v="3646"/>
-          <ac:spMkLst>
-            <pc:docMk/>
-            <pc:sldMk cId="3555087119" sldId="270"/>
-            <ac:spMk id="6" creationId="{2E2A297C-691D-73E6-FE94-BCB890344C53}"/>
-          </ac:spMkLst>
-        </pc:spChg>
-        <pc:spChg chg="add mod">
-          <ac:chgData name="Marc Hoischen" userId="3964d706-f28e-46f1-9012-ca23af3f907f" providerId="ADAL" clId="{D3FC0335-5B25-455D-BEDA-E81357F6A0D1}" dt="2023-01-30T15:44:55.857" v="3663"/>
-          <ac:spMkLst>
-            <pc:docMk/>
-            <pc:sldMk cId="3555087119" sldId="270"/>
-            <ac:spMk id="8" creationId="{F23C8E5A-1AB5-4BE7-9222-616ADF96750C}"/>
-          </ac:spMkLst>
-        </pc:spChg>
-        <pc:spChg chg="add mod">
-          <ac:chgData name="Marc Hoischen" userId="3964d706-f28e-46f1-9012-ca23af3f907f" providerId="ADAL" clId="{D3FC0335-5B25-455D-BEDA-E81357F6A0D1}" dt="2023-01-30T15:47:47.036" v="3966" actId="20577"/>
-          <ac:spMkLst>
-            <pc:docMk/>
-            <pc:sldMk cId="3555087119" sldId="270"/>
-            <ac:spMk id="14" creationId="{30FA3830-8B81-10C4-AD9B-4F5D4AB65955}"/>
-          </ac:spMkLst>
-        </pc:spChg>
-        <pc:spChg chg="add mod">
-          <ac:chgData name="Marc Hoischen" userId="3964d706-f28e-46f1-9012-ca23af3f907f" providerId="ADAL" clId="{D3FC0335-5B25-455D-BEDA-E81357F6A0D1}" dt="2023-01-30T15:48:30.581" v="4026" actId="20577"/>
-          <ac:spMkLst>
-            <pc:docMk/>
-            <pc:sldMk cId="3555087119" sldId="270"/>
-            <ac:spMk id="15" creationId="{1C463027-09EF-C334-DFF4-197209664BBC}"/>
-          </ac:spMkLst>
-        </pc:spChg>
-        <pc:picChg chg="add del mod">
-          <ac:chgData name="Marc Hoischen" userId="3964d706-f28e-46f1-9012-ca23af3f907f" providerId="ADAL" clId="{D3FC0335-5B25-455D-BEDA-E81357F6A0D1}" dt="2023-01-30T15:44:46.636" v="3660" actId="1076"/>
-          <ac:picMkLst>
-            <pc:docMk/>
-            <pc:sldMk cId="3555087119" sldId="270"/>
-            <ac:picMk id="5" creationId="{8B8DE3C2-0755-4C25-7FA7-EAA81D12367D}"/>
-          </ac:picMkLst>
-        </pc:picChg>
-        <pc:picChg chg="add mod">
-          <ac:chgData name="Marc Hoischen" userId="3964d706-f28e-46f1-9012-ca23af3f907f" providerId="ADAL" clId="{D3FC0335-5B25-455D-BEDA-E81357F6A0D1}" dt="2023-01-23T09:10:56.242" v="602" actId="1076"/>
-          <ac:picMkLst>
-            <pc:docMk/>
-            <pc:sldMk cId="3555087119" sldId="270"/>
-            <ac:picMk id="7" creationId="{937CC9D3-ACF3-9246-BB58-D02F174CBD6F}"/>
-          </ac:picMkLst>
-        </pc:picChg>
-        <pc:picChg chg="add del mod">
-          <ac:chgData name="Marc Hoischen" userId="3964d706-f28e-46f1-9012-ca23af3f907f" providerId="ADAL" clId="{D3FC0335-5B25-455D-BEDA-E81357F6A0D1}" dt="2023-01-30T15:44:47.691" v="3661" actId="1076"/>
-          <ac:picMkLst>
-            <pc:docMk/>
-            <pc:sldMk cId="3555087119" sldId="270"/>
-            <ac:picMk id="9" creationId="{FD876A14-9226-6941-64CD-7C21135CA54C}"/>
-          </ac:picMkLst>
-        </pc:picChg>
-        <pc:picChg chg="add del mod">
-          <ac:chgData name="Marc Hoischen" userId="3964d706-f28e-46f1-9012-ca23af3f907f" providerId="ADAL" clId="{D3FC0335-5B25-455D-BEDA-E81357F6A0D1}" dt="2023-01-30T15:41:56.385" v="3522" actId="478"/>
-          <ac:picMkLst>
-            <pc:docMk/>
-            <pc:sldMk cId="3555087119" sldId="270"/>
-            <ac:picMk id="11" creationId="{D8462A38-920E-5402-A35B-538C62A93B04}"/>
-          </ac:picMkLst>
-        </pc:picChg>
-        <pc:picChg chg="add del mod">
-          <ac:chgData name="Marc Hoischen" userId="3964d706-f28e-46f1-9012-ca23af3f907f" providerId="ADAL" clId="{D3FC0335-5B25-455D-BEDA-E81357F6A0D1}" dt="2023-01-30T15:47:49.205" v="3967" actId="478"/>
-          <ac:picMkLst>
-            <pc:docMk/>
-            <pc:sldMk cId="3555087119" sldId="270"/>
-            <ac:picMk id="12" creationId="{74C94A4F-B398-EEEF-8AE5-51BE69D4FC71}"/>
-          </ac:picMkLst>
-        </pc:picChg>
-        <pc:picChg chg="add del mod">
-          <ac:chgData name="Marc Hoischen" userId="3964d706-f28e-46f1-9012-ca23af3f907f" providerId="ADAL" clId="{D3FC0335-5B25-455D-BEDA-E81357F6A0D1}" dt="2023-01-30T15:41:56.986" v="3523" actId="478"/>
-          <ac:picMkLst>
-            <pc:docMk/>
-            <pc:sldMk cId="3555087119" sldId="270"/>
-            <ac:picMk id="13" creationId="{A4FA2A6D-7CC8-5D34-FB1F-BBD63F3B02A7}"/>
-          </ac:picMkLst>
-        </pc:picChg>
-      </pc:sldChg>
-      <pc:sldChg chg="modSp new mod">
-        <pc:chgData name="Marc Hoischen" userId="3964d706-f28e-46f1-9012-ca23af3f907f" providerId="ADAL" clId="{D3FC0335-5B25-455D-BEDA-E81357F6A0D1}" dt="2023-01-30T15:29:16.858" v="3519" actId="14100"/>
+      <pc:sldChg chg="addSp delSp modSp mod ord">
+        <pc:chgData name="Marc Hoischen" userId="3964d706-f28e-46f1-9012-ca23af3f907f" providerId="ADAL" clId="{6FABDF7B-03D7-4BB3-8BDF-EC0F04497DF5}" dt="2023-02-02T09:40:57.004" v="230" actId="20577"/>
         <pc:sldMkLst>
           <pc:docMk/>
           <pc:sldMk cId="865613293" sldId="271"/>
         </pc:sldMkLst>
         <pc:spChg chg="mod">
-          <ac:chgData name="Marc Hoischen" userId="3964d706-f28e-46f1-9012-ca23af3f907f" providerId="ADAL" clId="{D3FC0335-5B25-455D-BEDA-E81357F6A0D1}" dt="2023-01-30T15:29:16.858" v="3519" actId="14100"/>
+          <ac:chgData name="Marc Hoischen" userId="3964d706-f28e-46f1-9012-ca23af3f907f" providerId="ADAL" clId="{6FABDF7B-03D7-4BB3-8BDF-EC0F04497DF5}" dt="2023-02-02T09:40:57.004" v="230" actId="20577"/>
           <ac:spMkLst>
             <pc:docMk/>
             <pc:sldMk cId="865613293" sldId="271"/>
             <ac:spMk id="2" creationId="{9624BD17-8756-8BC4-EC40-8D7417C9B064}"/>
           </ac:spMkLst>
         </pc:spChg>
-        <pc:spChg chg="mod">
-          <ac:chgData name="Marc Hoischen" userId="3964d706-f28e-46f1-9012-ca23af3f907f" providerId="ADAL" clId="{D3FC0335-5B25-455D-BEDA-E81357F6A0D1}" dt="2023-01-30T13:24:10.469" v="1664" actId="20577"/>
+        <pc:spChg chg="del">
+          <ac:chgData name="Marc Hoischen" userId="3964d706-f28e-46f1-9012-ca23af3f907f" providerId="ADAL" clId="{6FABDF7B-03D7-4BB3-8BDF-EC0F04497DF5}" dt="2023-02-02T09:30:07.182" v="143" actId="478"/>
           <ac:spMkLst>
             <pc:docMk/>
             <pc:sldMk cId="865613293" sldId="271"/>
             <ac:spMk id="3" creationId="{6CF5D274-BB4F-19DD-0FE0-8AD0DB5A4912}"/>
           </ac:spMkLst>
         </pc:spChg>
+        <pc:spChg chg="add mod">
+          <ac:chgData name="Marc Hoischen" userId="3964d706-f28e-46f1-9012-ca23af3f907f" providerId="ADAL" clId="{6FABDF7B-03D7-4BB3-8BDF-EC0F04497DF5}" dt="2023-02-02T09:31:37.094" v="149" actId="14100"/>
+          <ac:spMkLst>
+            <pc:docMk/>
+            <pc:sldMk cId="865613293" sldId="271"/>
+            <ac:spMk id="5" creationId="{7831ABDE-333A-3692-8684-D07B3D63B3A4}"/>
+          </ac:spMkLst>
+        </pc:spChg>
+        <pc:spChg chg="add mod">
+          <ac:chgData name="Marc Hoischen" userId="3964d706-f28e-46f1-9012-ca23af3f907f" providerId="ADAL" clId="{6FABDF7B-03D7-4BB3-8BDF-EC0F04497DF5}" dt="2023-02-02T09:40:05.559" v="213" actId="20577"/>
+          <ac:spMkLst>
+            <pc:docMk/>
+            <pc:sldMk cId="865613293" sldId="271"/>
+            <ac:spMk id="10" creationId="{95E5F43C-5A0A-865D-4CAC-726EFFBA9F18}"/>
+          </ac:spMkLst>
+        </pc:spChg>
+        <pc:picChg chg="add mod">
+          <ac:chgData name="Marc Hoischen" userId="3964d706-f28e-46f1-9012-ca23af3f907f" providerId="ADAL" clId="{6FABDF7B-03D7-4BB3-8BDF-EC0F04497DF5}" dt="2023-02-02T09:32:09.771" v="151" actId="1076"/>
+          <ac:picMkLst>
+            <pc:docMk/>
+            <pc:sldMk cId="865613293" sldId="271"/>
+            <ac:picMk id="7" creationId="{8EB645A8-FA6C-7E71-D3D8-CDCA25E6A18A}"/>
+          </ac:picMkLst>
+        </pc:picChg>
+        <pc:picChg chg="add mod">
+          <ac:chgData name="Marc Hoischen" userId="3964d706-f28e-46f1-9012-ca23af3f907f" providerId="ADAL" clId="{6FABDF7B-03D7-4BB3-8BDF-EC0F04497DF5}" dt="2023-02-02T09:40:13.052" v="214" actId="1076"/>
+          <ac:picMkLst>
+            <pc:docMk/>
+            <pc:sldMk cId="865613293" sldId="271"/>
+            <ac:picMk id="9" creationId="{6149F8FB-938B-F464-D82B-66A0774980C9}"/>
+          </ac:picMkLst>
+        </pc:picChg>
       </pc:sldChg>
-      <pc:sldChg chg="modSp new mod">
-        <pc:chgData name="Marc Hoischen" userId="3964d706-f28e-46f1-9012-ca23af3f907f" providerId="ADAL" clId="{D3FC0335-5B25-455D-BEDA-E81357F6A0D1}" dt="2023-01-30T14:47:35.903" v="2112" actId="20577"/>
+      <pc:sldChg chg="modSp add mod">
+        <pc:chgData name="Marc Hoischen" userId="3964d706-f28e-46f1-9012-ca23af3f907f" providerId="ADAL" clId="{6FABDF7B-03D7-4BB3-8BDF-EC0F04497DF5}" dt="2023-02-02T09:29:44.182" v="113" actId="20577"/>
         <pc:sldMkLst>
           <pc:docMk/>
-          <pc:sldMk cId="2821443398" sldId="272"/>
+          <pc:sldMk cId="510885529" sldId="273"/>
         </pc:sldMkLst>
         <pc:spChg chg="mod">
-          <ac:chgData name="Marc Hoischen" userId="3964d706-f28e-46f1-9012-ca23af3f907f" providerId="ADAL" clId="{D3FC0335-5B25-455D-BEDA-E81357F6A0D1}" dt="2023-01-30T14:47:35.903" v="2112" actId="20577"/>
+          <ac:chgData name="Marc Hoischen" userId="3964d706-f28e-46f1-9012-ca23af3f907f" providerId="ADAL" clId="{6FABDF7B-03D7-4BB3-8BDF-EC0F04497DF5}" dt="2023-02-02T09:29:44.182" v="113" actId="20577"/>
           <ac:spMkLst>
             <pc:docMk/>
-            <pc:sldMk cId="2821443398" sldId="272"/>
-            <ac:spMk id="2" creationId="{B7389638-41E5-1956-0B13-D204B279A0C5}"/>
+            <pc:sldMk cId="510885529" sldId="273"/>
+            <ac:spMk id="3" creationId="{6CF5D274-BB4F-19DD-0FE0-8AD0DB5A4912}"/>
           </ac:spMkLst>
         </pc:spChg>
+      </pc:sldChg>
+      <pc:sldChg chg="add del">
+        <pc:chgData name="Marc Hoischen" userId="3964d706-f28e-46f1-9012-ca23af3f907f" providerId="ADAL" clId="{6FABDF7B-03D7-4BB3-8BDF-EC0F04497DF5}" dt="2023-02-02T09:30:11.466" v="145" actId="47"/>
+        <pc:sldMkLst>
+          <pc:docMk/>
+          <pc:sldMk cId="1360972212" sldId="274"/>
+        </pc:sldMkLst>
       </pc:sldChg>
     </pc:docChg>
   </pc:docChgLst>
@@ -1375,7 +435,7 @@
           <a:p>
             <a:fld id="{C485584D-7D79-4248-9986-4CA35242F944}" type="datetimeFigureOut">
               <a:rPr lang="en-US" smtClean="0"/>
-              <a:t>1/30/2023</a:t>
+              <a:t>2/2/2023</a:t>
             </a:fld>
             <a:endParaRPr lang="en-US"/>
           </a:p>
@@ -1749,7 +809,7 @@
           <a:p>
             <a:fld id="{C485584D-7D79-4248-9986-4CA35242F944}" type="datetimeFigureOut">
               <a:rPr lang="en-US" smtClean="0"/>
-              <a:t>1/30/2023</a:t>
+              <a:t>2/2/2023</a:t>
             </a:fld>
             <a:endParaRPr lang="en-US"/>
           </a:p>
@@ -1959,7 +1019,7 @@
           <a:p>
             <a:fld id="{C485584D-7D79-4248-9986-4CA35242F944}" type="datetimeFigureOut">
               <a:rPr lang="en-US" smtClean="0"/>
-              <a:t>1/30/2023</a:t>
+              <a:t>2/2/2023</a:t>
             </a:fld>
             <a:endParaRPr lang="en-US"/>
           </a:p>
@@ -2158,7 +1218,7 @@
           <a:p>
             <a:fld id="{C485584D-7D79-4248-9986-4CA35242F944}" type="datetimeFigureOut">
               <a:rPr lang="en-US" smtClean="0"/>
-              <a:t>1/30/2023</a:t>
+              <a:t>2/2/2023</a:t>
             </a:fld>
             <a:endParaRPr lang="en-US"/>
           </a:p>
@@ -2271,7 +1331,7 @@
           <a:p>
             <a:fld id="{C485584D-7D79-4248-9986-4CA35242F944}" type="datetimeFigureOut">
               <a:rPr lang="en-US" smtClean="0"/>
-              <a:t>1/30/2023</a:t>
+              <a:t>2/2/2023</a:t>
             </a:fld>
             <a:endParaRPr lang="en-US"/>
           </a:p>
@@ -3007,7 +2067,7 @@
           <a:p>
             <a:fld id="{C485584D-7D79-4248-9986-4CA35242F944}" type="datetimeFigureOut">
               <a:rPr lang="en-US" smtClean="0"/>
-              <a:t>1/30/2023</a:t>
+              <a:t>2/2/2023</a:t>
             </a:fld>
             <a:endParaRPr lang="en-US"/>
           </a:p>
@@ -3423,7 +2483,7 @@
           <a:p>
             <a:fld id="{C485584D-7D79-4248-9986-4CA35242F944}" type="datetimeFigureOut">
               <a:rPr lang="en-US" smtClean="0"/>
-              <a:t>1/30/2023</a:t>
+              <a:t>2/2/2023</a:t>
             </a:fld>
             <a:endParaRPr lang="en-US"/>
           </a:p>
@@ -3564,7 +2624,7 @@
           <a:p>
             <a:fld id="{C485584D-7D79-4248-9986-4CA35242F944}" type="datetimeFigureOut">
               <a:rPr lang="en-US" smtClean="0"/>
-              <a:t>1/30/2023</a:t>
+              <a:t>2/2/2023</a:t>
             </a:fld>
             <a:endParaRPr lang="en-US"/>
           </a:p>
@@ -3677,7 +2737,7 @@
           <a:p>
             <a:fld id="{C485584D-7D79-4248-9986-4CA35242F944}" type="datetimeFigureOut">
               <a:rPr lang="en-US" smtClean="0"/>
-              <a:t>1/30/2023</a:t>
+              <a:t>2/2/2023</a:t>
             </a:fld>
             <a:endParaRPr lang="en-US"/>
           </a:p>
@@ -3990,7 +3050,7 @@
           <a:p>
             <a:fld id="{C485584D-7D79-4248-9986-4CA35242F944}" type="datetimeFigureOut">
               <a:rPr lang="en-US" smtClean="0"/>
-              <a:t>1/30/2023</a:t>
+              <a:t>2/2/2023</a:t>
             </a:fld>
             <a:endParaRPr lang="en-US"/>
           </a:p>
@@ -4282,7 +3342,7 @@
           <a:p>
             <a:fld id="{C485584D-7D79-4248-9986-4CA35242F944}" type="datetimeFigureOut">
               <a:rPr lang="en-US" smtClean="0"/>
-              <a:t>1/30/2023</a:t>
+              <a:t>2/2/2023</a:t>
             </a:fld>
             <a:endParaRPr lang="en-US"/>
           </a:p>
@@ -4566,7 +3626,7 @@
           <a:p>
             <a:fld id="{C485584D-7D79-4248-9986-4CA35242F944}" type="datetimeFigureOut">
               <a:rPr lang="en-US" smtClean="0"/>
-              <a:t>1/30/2023</a:t>
+              <a:t>2/2/2023</a:t>
             </a:fld>
             <a:endParaRPr lang="en-US"/>
           </a:p>
@@ -6977,6 +6037,238 @@
               <a:t> Datei wichtig</a:t>
             </a:r>
           </a:p>
+          <a:p>
+            <a:pPr marL="342900" indent="-342900">
+              <a:buFont typeface="Arial" panose="020B0604020202020204" pitchFamily="34" charset="0"/>
+              <a:buChar char="•"/>
+            </a:pPr>
+            <a:r>
+              <a:rPr lang="de-DE" dirty="0"/>
+              <a:t>Wichtig: nach ändern der </a:t>
+            </a:r>
+            <a:r>
+              <a:rPr lang="de-DE" dirty="0" err="1"/>
+              <a:t>xacro</a:t>
+            </a:r>
+            <a:r>
+              <a:rPr lang="de-DE" dirty="0"/>
+              <a:t> Dateien </a:t>
+            </a:r>
+            <a:r>
+              <a:rPr lang="de-DE" dirty="0" err="1"/>
+              <a:t>catkin_make</a:t>
+            </a:r>
+            <a:r>
+              <a:rPr lang="de-DE" dirty="0"/>
+              <a:t> ausführen, damit die Änderungen wirksam werden</a:t>
+            </a:r>
+          </a:p>
+        </p:txBody>
+      </p:sp>
+    </p:spTree>
+    <p:extLst>
+      <p:ext uri="{BB962C8B-B14F-4D97-AF65-F5344CB8AC3E}">
+        <p14:creationId xmlns:p14="http://schemas.microsoft.com/office/powerpoint/2010/main" val="510885529"/>
+      </p:ext>
+    </p:extLst>
+  </p:cSld>
+  <p:clrMapOvr>
+    <a:masterClrMapping/>
+  </p:clrMapOvr>
+</p:sld>
+</file>
+
+<file path=ppt/slides/slide16.xml><?xml version="1.0" encoding="utf-8"?>
+<p:sld xmlns:a="http://schemas.openxmlformats.org/drawingml/2006/main" xmlns:r="http://schemas.openxmlformats.org/officeDocument/2006/relationships" xmlns:p="http://schemas.openxmlformats.org/presentationml/2006/main">
+  <p:cSld>
+    <p:spTree>
+      <p:nvGrpSpPr>
+        <p:cNvPr id="1" name=""/>
+        <p:cNvGrpSpPr/>
+        <p:nvPr/>
+      </p:nvGrpSpPr>
+      <p:grpSpPr>
+        <a:xfrm>
+          <a:off x="0" y="0"/>
+          <a:ext cx="0" cy="0"/>
+          <a:chOff x="0" y="0"/>
+          <a:chExt cx="0" cy="0"/>
+        </a:xfrm>
+      </p:grpSpPr>
+      <p:sp>
+        <p:nvSpPr>
+          <p:cNvPr id="2" name="Titel 1">
+            <a:extLst>
+              <a:ext uri="{FF2B5EF4-FFF2-40B4-BE49-F238E27FC236}">
+                <a16:creationId xmlns:a16="http://schemas.microsoft.com/office/drawing/2014/main" id="{9624BD17-8756-8BC4-EC40-8D7417C9B064}"/>
+              </a:ext>
+            </a:extLst>
+          </p:cNvPr>
+          <p:cNvSpPr>
+            <a:spLocks noGrp="1"/>
+          </p:cNvSpPr>
+          <p:nvPr>
+            <p:ph type="title"/>
+          </p:nvPr>
+        </p:nvSpPr>
+        <p:spPr>
+          <a:xfrm>
+            <a:off x="1028700" y="723900"/>
+            <a:ext cx="10134600" cy="666749"/>
+          </a:xfrm>
+        </p:spPr>
+        <p:txBody>
+          <a:bodyPr>
+            <a:normAutofit/>
+          </a:bodyPr>
+          <a:lstStyle/>
+          <a:p>
+            <a:r>
+              <a:rPr lang="de-DE" dirty="0"/>
+              <a:t>Nebel und Licht einstellen</a:t>
+            </a:r>
+          </a:p>
+        </p:txBody>
+      </p:sp>
+      <p:sp>
+        <p:nvSpPr>
+          <p:cNvPr id="5" name="Inhaltsplatzhalter 4">
+            <a:extLst>
+              <a:ext uri="{FF2B5EF4-FFF2-40B4-BE49-F238E27FC236}">
+                <a16:creationId xmlns:a16="http://schemas.microsoft.com/office/drawing/2014/main" id="{7831ABDE-333A-3692-8684-D07B3D63B3A4}"/>
+              </a:ext>
+            </a:extLst>
+          </p:cNvPr>
+          <p:cNvSpPr>
+            <a:spLocks noGrp="1"/>
+          </p:cNvSpPr>
+          <p:nvPr>
+            <p:ph idx="1"/>
+          </p:nvPr>
+        </p:nvSpPr>
+        <p:spPr>
+          <a:xfrm>
+            <a:off x="1028700" y="5710687"/>
+            <a:ext cx="10134600" cy="420558"/>
+          </a:xfrm>
+        </p:spPr>
+        <p:txBody>
+          <a:bodyPr/>
+          <a:lstStyle/>
+          <a:p>
+            <a:r>
+              <a:rPr lang="de-DE" dirty="0"/>
+              <a:t>https://github.com/osrf/vrx/wiki/changing_visual_params_tutorial</a:t>
+            </a:r>
+          </a:p>
+        </p:txBody>
+      </p:sp>
+      <p:pic>
+        <p:nvPicPr>
+          <p:cNvPr id="7" name="Grafik 6">
+            <a:extLst>
+              <a:ext uri="{FF2B5EF4-FFF2-40B4-BE49-F238E27FC236}">
+                <a16:creationId xmlns:a16="http://schemas.microsoft.com/office/drawing/2014/main" id="{8EB645A8-FA6C-7E71-D3D8-CDCA25E6A18A}"/>
+              </a:ext>
+            </a:extLst>
+          </p:cNvPr>
+          <p:cNvPicPr>
+            <a:picLocks noChangeAspect="1"/>
+          </p:cNvPicPr>
+          <p:nvPr/>
+        </p:nvPicPr>
+        <p:blipFill>
+          <a:blip r:embed="rId2"/>
+          <a:stretch>
+            <a:fillRect/>
+          </a:stretch>
+        </p:blipFill>
+        <p:spPr>
+          <a:xfrm>
+            <a:off x="466694" y="1461921"/>
+            <a:ext cx="6192899" cy="4058146"/>
+          </a:xfrm>
+          <a:prstGeom prst="rect">
+            <a:avLst/>
+          </a:prstGeom>
+        </p:spPr>
+      </p:pic>
+      <p:pic>
+        <p:nvPicPr>
+          <p:cNvPr id="9" name="Grafik 8">
+            <a:extLst>
+              <a:ext uri="{FF2B5EF4-FFF2-40B4-BE49-F238E27FC236}">
+                <a16:creationId xmlns:a16="http://schemas.microsoft.com/office/drawing/2014/main" id="{6149F8FB-938B-F464-D82B-66A0774980C9}"/>
+              </a:ext>
+            </a:extLst>
+          </p:cNvPr>
+          <p:cNvPicPr>
+            <a:picLocks noChangeAspect="1"/>
+          </p:cNvPicPr>
+          <p:nvPr/>
+        </p:nvPicPr>
+        <p:blipFill>
+          <a:blip r:embed="rId3"/>
+          <a:stretch>
+            <a:fillRect/>
+          </a:stretch>
+        </p:blipFill>
+        <p:spPr>
+          <a:xfrm>
+            <a:off x="7121193" y="1670605"/>
+            <a:ext cx="4604113" cy="2207516"/>
+          </a:xfrm>
+          <a:prstGeom prst="rect">
+            <a:avLst/>
+          </a:prstGeom>
+        </p:spPr>
+      </p:pic>
+      <p:sp>
+        <p:nvSpPr>
+          <p:cNvPr id="10" name="Textfeld 9">
+            <a:extLst>
+              <a:ext uri="{FF2B5EF4-FFF2-40B4-BE49-F238E27FC236}">
+                <a16:creationId xmlns:a16="http://schemas.microsoft.com/office/drawing/2014/main" id="{95E5F43C-5A0A-865D-4CAC-726EFFBA9F18}"/>
+              </a:ext>
+            </a:extLst>
+          </p:cNvPr>
+          <p:cNvSpPr txBox="1"/>
+          <p:nvPr/>
+        </p:nvSpPr>
+        <p:spPr>
+          <a:xfrm>
+            <a:off x="8280000" y="4784400"/>
+            <a:ext cx="3469060" cy="646331"/>
+          </a:xfrm>
+          <a:prstGeom prst="rect">
+            <a:avLst/>
+          </a:prstGeom>
+          <a:solidFill>
+            <a:schemeClr val="accent6">
+              <a:lumMod val="20000"/>
+              <a:lumOff val="80000"/>
+            </a:schemeClr>
+          </a:solidFill>
+        </p:spPr>
+        <p:txBody>
+          <a:bodyPr wrap="square" rtlCol="0">
+            <a:spAutoFit/>
+          </a:bodyPr>
+          <a:lstStyle/>
+          <a:p>
+            <a:r>
+              <a:rPr lang="de-DE" dirty="0"/>
+              <a:t>Auch hier ist nach jeder Änderung </a:t>
+            </a:r>
+            <a:r>
+              <a:rPr lang="de-DE" dirty="0" err="1"/>
+              <a:t>catkin_make</a:t>
+            </a:r>
+            <a:r>
+              <a:rPr lang="de-DE" dirty="0"/>
+              <a:t> auszuführen</a:t>
+            </a:r>
+          </a:p>
         </p:txBody>
       </p:sp>
     </p:spTree>
@@ -7061,7 +6353,7 @@
         </p:nvSpPr>
         <p:spPr>
           <a:xfrm>
-            <a:off x="8280000" y="2880000"/>
+            <a:off x="8280000" y="4788000"/>
             <a:ext cx="3376246" cy="1200329"/>
           </a:xfrm>
           <a:prstGeom prst="rect">
@@ -7163,7 +6455,7 @@
         </p:nvSpPr>
         <p:spPr>
           <a:xfrm>
-            <a:off x="8280000" y="2880000"/>
+            <a:off x="8280000" y="4788000"/>
             <a:ext cx="3376246" cy="1754326"/>
           </a:xfrm>
           <a:prstGeom prst="rect">
@@ -7343,7 +6635,7 @@
         </p:nvSpPr>
         <p:spPr>
           <a:xfrm>
-            <a:off x="8280000" y="2880000"/>
+            <a:off x="8280000" y="4788000"/>
             <a:ext cx="3376246" cy="1200329"/>
           </a:xfrm>
           <a:prstGeom prst="rect">
@@ -7451,7 +6743,7 @@
         </p:nvSpPr>
         <p:spPr>
           <a:xfrm>
-            <a:off x="8280000" y="4783016"/>
+            <a:off x="8280000" y="4788000"/>
             <a:ext cx="3376246" cy="1477328"/>
           </a:xfrm>
           <a:prstGeom prst="rect">
@@ -7959,7 +7251,7 @@
         </p:nvSpPr>
         <p:spPr>
           <a:xfrm>
-            <a:off x="626689" y="1363541"/>
+            <a:off x="8280000" y="1363541"/>
             <a:ext cx="3497635" cy="1477328"/>
           </a:xfrm>
           <a:prstGeom prst="rect">
@@ -8197,4 +7489,245 @@
     </a:ext>
   </a:extLst>
 </a:theme>
+</file>
+
+<file path=customXml/item1.xml><?xml version="1.0" encoding="utf-8"?>
+<p:properties xmlns:p="http://schemas.microsoft.com/office/2006/metadata/properties" xmlns:xsi="http://www.w3.org/2001/XMLSchema-instance" xmlns:pc="http://schemas.microsoft.com/office/infopath/2007/PartnerControls">
+  <documentManagement>
+    <TaxCatchAll xmlns="86bcc597-b900-4403-ae0d-630de7837efe" xsi:nil="true"/>
+    <lcf76f155ced4ddcb4097134ff3c332f xmlns="afd73b97-26da-4832-b47e-32a036c31d0e">
+      <Terms xmlns="http://schemas.microsoft.com/office/infopath/2007/PartnerControls"/>
+    </lcf76f155ced4ddcb4097134ff3c332f>
+  </documentManagement>
+</p:properties>
+</file>
+
+<file path=customXml/item2.xml><?xml version="1.0" encoding="utf-8"?>
+<ct:contentTypeSchema xmlns:ct="http://schemas.microsoft.com/office/2006/metadata/contentType" xmlns:ma="http://schemas.microsoft.com/office/2006/metadata/properties/metaAttributes" ct:_="" ma:_="" ma:contentTypeName="Dokument" ma:contentTypeID="0x010100E5D3BE551960214CAA4120E3DF7DC3B8" ma:contentTypeVersion="8" ma:contentTypeDescription="Ein neues Dokument erstellen." ma:contentTypeScope="" ma:versionID="4606203468f2b8bb77480feffd9af2ae">
+  <xsd:schema xmlns:xsd="http://www.w3.org/2001/XMLSchema" xmlns:xs="http://www.w3.org/2001/XMLSchema" xmlns:p="http://schemas.microsoft.com/office/2006/metadata/properties" xmlns:ns2="afd73b97-26da-4832-b47e-32a036c31d0e" xmlns:ns3="86bcc597-b900-4403-ae0d-630de7837efe" targetNamespace="http://schemas.microsoft.com/office/2006/metadata/properties" ma:root="true" ma:fieldsID="ebcee93e0e3772286e313b2d4b36bfda" ns2:_="" ns3:_="">
+    <xsd:import namespace="afd73b97-26da-4832-b47e-32a036c31d0e"/>
+    <xsd:import namespace="86bcc597-b900-4403-ae0d-630de7837efe"/>
+    <xsd:element name="properties">
+      <xsd:complexType>
+        <xsd:sequence>
+          <xsd:element name="documentManagement">
+            <xsd:complexType>
+              <xsd:all>
+                <xsd:element ref="ns2:MediaServiceMetadata" minOccurs="0"/>
+                <xsd:element ref="ns2:MediaServiceFastMetadata" minOccurs="0"/>
+                <xsd:element ref="ns2:lcf76f155ced4ddcb4097134ff3c332f" minOccurs="0"/>
+                <xsd:element ref="ns3:TaxCatchAll" minOccurs="0"/>
+                <xsd:element ref="ns2:MediaServiceOCR" minOccurs="0"/>
+                <xsd:element ref="ns2:MediaServiceGenerationTime" minOccurs="0"/>
+                <xsd:element ref="ns2:MediaServiceEventHashCode" minOccurs="0"/>
+              </xsd:all>
+            </xsd:complexType>
+          </xsd:element>
+        </xsd:sequence>
+      </xsd:complexType>
+    </xsd:element>
+  </xsd:schema>
+  <xsd:schema xmlns:xsd="http://www.w3.org/2001/XMLSchema" xmlns:xs="http://www.w3.org/2001/XMLSchema" xmlns:dms="http://schemas.microsoft.com/office/2006/documentManagement/types" xmlns:pc="http://schemas.microsoft.com/office/infopath/2007/PartnerControls" targetNamespace="afd73b97-26da-4832-b47e-32a036c31d0e" elementFormDefault="qualified">
+    <xsd:import namespace="http://schemas.microsoft.com/office/2006/documentManagement/types"/>
+    <xsd:import namespace="http://schemas.microsoft.com/office/infopath/2007/PartnerControls"/>
+    <xsd:element name="MediaServiceMetadata" ma:index="8" nillable="true" ma:displayName="MediaServiceMetadata" ma:hidden="true" ma:internalName="MediaServiceMetadata" ma:readOnly="true">
+      <xsd:simpleType>
+        <xsd:restriction base="dms:Note"/>
+      </xsd:simpleType>
+    </xsd:element>
+    <xsd:element name="MediaServiceFastMetadata" ma:index="9" nillable="true" ma:displayName="MediaServiceFastMetadata" ma:hidden="true" ma:internalName="MediaServiceFastMetadata" ma:readOnly="true">
+      <xsd:simpleType>
+        <xsd:restriction base="dms:Note"/>
+      </xsd:simpleType>
+    </xsd:element>
+    <xsd:element name="lcf76f155ced4ddcb4097134ff3c332f" ma:index="11" nillable="true" ma:taxonomy="true" ma:internalName="lcf76f155ced4ddcb4097134ff3c332f" ma:taxonomyFieldName="MediaServiceImageTags" ma:displayName="Bildmarkierungen" ma:readOnly="false" ma:fieldId="{5cf76f15-5ced-4ddc-b409-7134ff3c332f}" ma:taxonomyMulti="true" ma:sspId="b8572169-3b1a-45ea-9420-1908a052c123" ma:termSetId="09814cd3-568e-fe90-9814-8d621ff8fb84" ma:anchorId="fba54fb3-c3e1-fe81-a776-ca4b69148c4d" ma:open="true" ma:isKeyword="false">
+      <xsd:complexType>
+        <xsd:sequence>
+          <xsd:element ref="pc:Terms" minOccurs="0" maxOccurs="1"/>
+        </xsd:sequence>
+      </xsd:complexType>
+    </xsd:element>
+    <xsd:element name="MediaServiceOCR" ma:index="13" nillable="true" ma:displayName="Extracted Text" ma:internalName="MediaServiceOCR" ma:readOnly="true">
+      <xsd:simpleType>
+        <xsd:restriction base="dms:Note">
+          <xsd:maxLength value="255"/>
+        </xsd:restriction>
+      </xsd:simpleType>
+    </xsd:element>
+    <xsd:element name="MediaServiceGenerationTime" ma:index="14" nillable="true" ma:displayName="MediaServiceGenerationTime" ma:hidden="true" ma:internalName="MediaServiceGenerationTime" ma:readOnly="true">
+      <xsd:simpleType>
+        <xsd:restriction base="dms:Text"/>
+      </xsd:simpleType>
+    </xsd:element>
+    <xsd:element name="MediaServiceEventHashCode" ma:index="15" nillable="true" ma:displayName="MediaServiceEventHashCode" ma:hidden="true" ma:internalName="MediaServiceEventHashCode" ma:readOnly="true">
+      <xsd:simpleType>
+        <xsd:restriction base="dms:Text"/>
+      </xsd:simpleType>
+    </xsd:element>
+  </xsd:schema>
+  <xsd:schema xmlns:xsd="http://www.w3.org/2001/XMLSchema" xmlns:xs="http://www.w3.org/2001/XMLSchema" xmlns:dms="http://schemas.microsoft.com/office/2006/documentManagement/types" xmlns:pc="http://schemas.microsoft.com/office/infopath/2007/PartnerControls" targetNamespace="86bcc597-b900-4403-ae0d-630de7837efe" elementFormDefault="qualified">
+    <xsd:import namespace="http://schemas.microsoft.com/office/2006/documentManagement/types"/>
+    <xsd:import namespace="http://schemas.microsoft.com/office/infopath/2007/PartnerControls"/>
+    <xsd:element name="TaxCatchAll" ma:index="12" nillable="true" ma:displayName="Taxonomy Catch All Column" ma:hidden="true" ma:list="{4ff3c29b-cb1b-4b19-affd-7d599946a7c2}" ma:internalName="TaxCatchAll" ma:showField="CatchAllData" ma:web="86bcc597-b900-4403-ae0d-630de7837efe">
+      <xsd:complexType>
+        <xsd:complexContent>
+          <xsd:extension base="dms:MultiChoiceLookup">
+            <xsd:sequence>
+              <xsd:element name="Value" type="dms:Lookup" maxOccurs="unbounded" minOccurs="0" nillable="true"/>
+            </xsd:sequence>
+          </xsd:extension>
+        </xsd:complexContent>
+      </xsd:complexType>
+    </xsd:element>
+  </xsd:schema>
+  <xsd:schema xmlns="http://schemas.openxmlformats.org/package/2006/metadata/core-properties" xmlns:xsd="http://www.w3.org/2001/XMLSchema" xmlns:xsi="http://www.w3.org/2001/XMLSchema-instance" xmlns:dc="http://purl.org/dc/elements/1.1/" xmlns:dcterms="http://purl.org/dc/terms/" xmlns:odoc="http://schemas.microsoft.com/internal/obd" targetNamespace="http://schemas.openxmlformats.org/package/2006/metadata/core-properties" elementFormDefault="qualified" attributeFormDefault="unqualified" blockDefault="#all">
+    <xsd:import namespace="http://purl.org/dc/elements/1.1/" schemaLocation="http://dublincore.org/schemas/xmls/qdc/2003/04/02/dc.xsd"/>
+    <xsd:import namespace="http://purl.org/dc/terms/" schemaLocation="http://dublincore.org/schemas/xmls/qdc/2003/04/02/dcterms.xsd"/>
+    <xsd:element name="coreProperties" type="CT_coreProperties"/>
+    <xsd:complexType name="CT_coreProperties">
+      <xsd:all>
+        <xsd:element ref="dc:creator" minOccurs="0" maxOccurs="1"/>
+        <xsd:element ref="dcterms:created" minOccurs="0" maxOccurs="1"/>
+        <xsd:element ref="dc:identifier" minOccurs="0" maxOccurs="1"/>
+        <xsd:element name="contentType" minOccurs="0" maxOccurs="1" type="xsd:string" ma:index="0" ma:displayName="Inhaltstyp"/>
+        <xsd:element ref="dc:title" minOccurs="0" maxOccurs="1" ma:index="4" ma:displayName="Titel"/>
+        <xsd:element ref="dc:subject" minOccurs="0" maxOccurs="1"/>
+        <xsd:element ref="dc:description" minOccurs="0" maxOccurs="1"/>
+        <xsd:element name="keywords" minOccurs="0" maxOccurs="1" type="xsd:string"/>
+        <xsd:element ref="dc:language" minOccurs="0" maxOccurs="1"/>
+        <xsd:element name="category" minOccurs="0" maxOccurs="1" type="xsd:string"/>
+        <xsd:element name="version" minOccurs="0" maxOccurs="1" type="xsd:string"/>
+        <xsd:element name="revision" minOccurs="0" maxOccurs="1" type="xsd:string">
+          <xsd:annotation>
+            <xsd:documentation>
+                        This value indicates the number of saves or revisions. The application is responsible for updating this value after each revision.
+                    </xsd:documentation>
+          </xsd:annotation>
+        </xsd:element>
+        <xsd:element name="lastModifiedBy" minOccurs="0" maxOccurs="1" type="xsd:string"/>
+        <xsd:element ref="dcterms:modified" minOccurs="0" maxOccurs="1"/>
+        <xsd:element name="contentStatus" minOccurs="0" maxOccurs="1" type="xsd:string"/>
+      </xsd:all>
+    </xsd:complexType>
+  </xsd:schema>
+  <xs:schema xmlns:pc="http://schemas.microsoft.com/office/infopath/2007/PartnerControls" xmlns:xs="http://www.w3.org/2001/XMLSchema" targetNamespace="http://schemas.microsoft.com/office/infopath/2007/PartnerControls" elementFormDefault="qualified" attributeFormDefault="unqualified">
+    <xs:element name="Person">
+      <xs:complexType>
+        <xs:sequence>
+          <xs:element ref="pc:DisplayName" minOccurs="0"/>
+          <xs:element ref="pc:AccountId" minOccurs="0"/>
+          <xs:element ref="pc:AccountType" minOccurs="0"/>
+        </xs:sequence>
+      </xs:complexType>
+    </xs:element>
+    <xs:element name="DisplayName" type="xs:string"/>
+    <xs:element name="AccountId" type="xs:string"/>
+    <xs:element name="AccountType" type="xs:string"/>
+    <xs:element name="BDCAssociatedEntity">
+      <xs:complexType>
+        <xs:sequence>
+          <xs:element ref="pc:BDCEntity" minOccurs="0" maxOccurs="unbounded"/>
+        </xs:sequence>
+        <xs:attribute ref="pc:EntityNamespace"/>
+        <xs:attribute ref="pc:EntityName"/>
+        <xs:attribute ref="pc:SystemInstanceName"/>
+        <xs:attribute ref="pc:AssociationName"/>
+      </xs:complexType>
+    </xs:element>
+    <xs:attribute name="EntityNamespace" type="xs:string"/>
+    <xs:attribute name="EntityName" type="xs:string"/>
+    <xs:attribute name="SystemInstanceName" type="xs:string"/>
+    <xs:attribute name="AssociationName" type="xs:string"/>
+    <xs:element name="BDCEntity">
+      <xs:complexType>
+        <xs:sequence>
+          <xs:element ref="pc:EntityDisplayName" minOccurs="0"/>
+          <xs:element ref="pc:EntityInstanceReference" minOccurs="0"/>
+          <xs:element ref="pc:EntityId1" minOccurs="0"/>
+          <xs:element ref="pc:EntityId2" minOccurs="0"/>
+          <xs:element ref="pc:EntityId3" minOccurs="0"/>
+          <xs:element ref="pc:EntityId4" minOccurs="0"/>
+          <xs:element ref="pc:EntityId5" minOccurs="0"/>
+        </xs:sequence>
+      </xs:complexType>
+    </xs:element>
+    <xs:element name="EntityDisplayName" type="xs:string"/>
+    <xs:element name="EntityInstanceReference" type="xs:string"/>
+    <xs:element name="EntityId1" type="xs:string"/>
+    <xs:element name="EntityId2" type="xs:string"/>
+    <xs:element name="EntityId3" type="xs:string"/>
+    <xs:element name="EntityId4" type="xs:string"/>
+    <xs:element name="EntityId5" type="xs:string"/>
+    <xs:element name="Terms">
+      <xs:complexType>
+        <xs:sequence>
+          <xs:element ref="pc:TermInfo" minOccurs="0" maxOccurs="unbounded"/>
+        </xs:sequence>
+      </xs:complexType>
+    </xs:element>
+    <xs:element name="TermInfo">
+      <xs:complexType>
+        <xs:sequence>
+          <xs:element ref="pc:TermName" minOccurs="0"/>
+          <xs:element ref="pc:TermId" minOccurs="0"/>
+        </xs:sequence>
+      </xs:complexType>
+    </xs:element>
+    <xs:element name="TermName" type="xs:string"/>
+    <xs:element name="TermId" type="xs:string"/>
+  </xs:schema>
+</ct:contentTypeSchema>
+</file>
+
+<file path=customXml/item3.xml><?xml version="1.0" encoding="utf-8"?>
+<?mso-contentType ?>
+<FormTemplates xmlns="http://schemas.microsoft.com/sharepoint/v3/contenttype/forms">
+  <Display>DocumentLibraryForm</Display>
+  <Edit>DocumentLibraryForm</Edit>
+  <New>DocumentLibraryForm</New>
+</FormTemplates>
+</file>
+
+<file path=customXml/itemProps1.xml><?xml version="1.0" encoding="utf-8"?>
+<ds:datastoreItem xmlns:ds="http://schemas.openxmlformats.org/officeDocument/2006/customXml" ds:itemID="{A86A3AB5-2AC7-4C23-9E4A-EBEDC8855995}">
+  <ds:schemaRefs>
+    <ds:schemaRef ds:uri="afd73b97-26da-4832-b47e-32a036c31d0e"/>
+    <ds:schemaRef ds:uri="http://www.w3.org/XML/1998/namespace"/>
+    <ds:schemaRef ds:uri="http://schemas.openxmlformats.org/package/2006/metadata/core-properties"/>
+    <ds:schemaRef ds:uri="http://schemas.microsoft.com/office/2006/documentManagement/types"/>
+    <ds:schemaRef ds:uri="http://schemas.microsoft.com/office/infopath/2007/PartnerControls"/>
+    <ds:schemaRef ds:uri="86bcc597-b900-4403-ae0d-630de7837efe"/>
+    <ds:schemaRef ds:uri="http://purl.org/dc/terms/"/>
+    <ds:schemaRef ds:uri="http://schemas.microsoft.com/office/2006/metadata/properties"/>
+    <ds:schemaRef ds:uri="http://purl.org/dc/dcmitype/"/>
+    <ds:schemaRef ds:uri="http://purl.org/dc/elements/1.1/"/>
+  </ds:schemaRefs>
+</ds:datastoreItem>
+</file>
+
+<file path=customXml/itemProps2.xml><?xml version="1.0" encoding="utf-8"?>
+<ds:datastoreItem xmlns:ds="http://schemas.openxmlformats.org/officeDocument/2006/customXml" ds:itemID="{2E834059-2BE4-4CB7-B722-F7E576FE4C4F}">
+  <ds:schemaRefs>
+    <ds:schemaRef ds:uri="http://schemas.microsoft.com/office/2006/metadata/contentType"/>
+    <ds:schemaRef ds:uri="http://schemas.microsoft.com/office/2006/metadata/properties/metaAttributes"/>
+    <ds:schemaRef ds:uri="http://www.w3.org/2001/XMLSchema"/>
+    <ds:schemaRef ds:uri="http://schemas.microsoft.com/office/2006/metadata/properties"/>
+    <ds:schemaRef ds:uri="afd73b97-26da-4832-b47e-32a036c31d0e"/>
+    <ds:schemaRef ds:uri="86bcc597-b900-4403-ae0d-630de7837efe"/>
+    <ds:schemaRef ds:uri="http://schemas.microsoft.com/office/2006/documentManagement/types"/>
+    <ds:schemaRef ds:uri="http://schemas.microsoft.com/office/infopath/2007/PartnerControls"/>
+    <ds:schemaRef ds:uri="http://schemas.openxmlformats.org/package/2006/metadata/core-properties"/>
+    <ds:schemaRef ds:uri="http://purl.org/dc/elements/1.1/"/>
+    <ds:schemaRef ds:uri="http://purl.org/dc/terms/"/>
+    <ds:schemaRef ds:uri="http://schemas.microsoft.com/internal/obd"/>
+  </ds:schemaRefs>
+</ds:datastoreItem>
+</file>
+
+<file path=customXml/itemProps3.xml><?xml version="1.0" encoding="utf-8"?>
+<ds:datastoreItem xmlns:ds="http://schemas.openxmlformats.org/officeDocument/2006/customXml" ds:itemID="{14466D95-65EA-40E5-9CA5-EA4AA43B264F}">
+  <ds:schemaRefs>
+    <ds:schemaRef ds:uri="http://schemas.microsoft.com/sharepoint/v3/contenttype/forms"/>
+  </ds:schemaRefs>
+</ds:datastoreItem>
 </file>
</xml_diff>